<commit_message>
p3 livrables version finale
</commit_message>
<xml_diff>
--- a/projet_3_solution_tours_fors_life/livrables/P3_lignereux_steven/P3_01_presentation.pptx
+++ b/projet_3_solution_tours_fors_life/livrables/P3_lignereux_steven/P3_01_presentation.pptx
@@ -20,23 +20,25 @@
     <p:sldId id="265" r:id="rId15"/>
     <p:sldId id="266" r:id="rId16"/>
     <p:sldId id="267" r:id="rId17"/>
+    <p:sldId id="268" r:id="rId18"/>
+    <p:sldId id="269" r:id="rId19"/>
   </p:sldIdLst>
   <p:sldSz cy="5143500" cx="9144000"/>
   <p:notesSz cx="6858000" cy="9144000"/>
   <p:embeddedFontLst>
     <p:embeddedFont>
       <p:font typeface="Montserrat"/>
-      <p:regular r:id="rId18"/>
-      <p:bold r:id="rId19"/>
-      <p:italic r:id="rId20"/>
-      <p:boldItalic r:id="rId21"/>
+      <p:regular r:id="rId20"/>
+      <p:bold r:id="rId21"/>
+      <p:italic r:id="rId22"/>
+      <p:boldItalic r:id="rId23"/>
     </p:embeddedFont>
     <p:embeddedFont>
       <p:font typeface="Lato"/>
-      <p:regular r:id="rId22"/>
-      <p:bold r:id="rId23"/>
-      <p:italic r:id="rId24"/>
-      <p:boldItalic r:id="rId25"/>
+      <p:regular r:id="rId24"/>
+      <p:bold r:id="rId25"/>
+      <p:italic r:id="rId26"/>
+      <p:boldItalic r:id="rId27"/>
     </p:embeddedFont>
   </p:embeddedFontLst>
   <p:defaultTextStyle>
@@ -284,7 +286,7 @@
       </p15:sldGuideLst>
     </p:ext>
     <p:ext uri="http://customooxmlschemas.google.com/">
-      <go:slidesCustomData xmlns:go="http://customooxmlschemas.google.com/" r:id="rId26" roundtripDataSignature="AMtx7mhfyEDKHVg3XPJ+vqiN27gfAP7Qcw=="/>
+      <go:slidesCustomData xmlns:go="http://customooxmlschemas.google.com/" r:id="rId28" roundtripDataSignature="AMtx7mgyh4c7JkrN0tUtgYqeFJCYxHklbQ=="/>
     </p:ext>
   </p:extLst>
 </p:presentation>
@@ -1302,6 +1304,222 @@
                 <a:spcPts val="0"/>
               </a:spcAft>
               <a:buSzPts val="1100"/>
+              <a:buNone/>
+            </a:pPr>
+            <a:r>
+              <a:t/>
+            </a:r>
+            <a:endParaRPr/>
+          </a:p>
+        </p:txBody>
+      </p:sp>
+    </p:spTree>
+  </p:cSld>
+  <p:clrMapOvr>
+    <a:masterClrMapping/>
+  </p:clrMapOvr>
+</p:notes>
+</file>
+
+<file path=ppt/notesSlides/notesSlide13.xml><?xml version="1.0" encoding="utf-8"?>
+<p:notes xmlns:a="http://schemas.openxmlformats.org/drawingml/2006/main" xmlns:r="http://schemas.openxmlformats.org/officeDocument/2006/relationships" xmlns:mc="http://schemas.openxmlformats.org/markup-compatibility/2006" xmlns:mv="urn:schemas-microsoft-com:mac:vml" xmlns:p="http://schemas.openxmlformats.org/presentationml/2006/main" xmlns:c="http://schemas.openxmlformats.org/drawingml/2006/chart" xmlns:dgm="http://schemas.openxmlformats.org/drawingml/2006/diagram" xmlns:o="urn:schemas-microsoft-com:office:office" xmlns:v="urn:schemas-microsoft-com:vml" xmlns:pvml="urn:schemas-microsoft-com:office:powerpoint" xmlns:com="http://schemas.openxmlformats.org/drawingml/2006/compatibility" xmlns:p14="http://schemas.microsoft.com/office/powerpoint/2010/main" xmlns:p15="http://schemas.microsoft.com/office/powerpoint/2012/main" xmlns:ahyp="http://schemas.microsoft.com/office/drawing/2018/hyperlinkcolor" showMasterPhAnim="0" showMasterSp="0">
+  <p:cSld>
+    <p:spTree>
+      <p:nvGrpSpPr>
+        <p:cNvPr id="205" name="Shape 205"/>
+        <p:cNvGrpSpPr/>
+        <p:nvPr/>
+      </p:nvGrpSpPr>
+      <p:grpSpPr>
+        <a:xfrm>
+          <a:off x="0" y="0"/>
+          <a:ext cx="0" cy="0"/>
+          <a:chOff x="0" y="0"/>
+          <a:chExt cx="0" cy="0"/>
+        </a:xfrm>
+      </p:grpSpPr>
+      <p:sp>
+        <p:nvSpPr>
+          <p:cNvPr id="206" name="Google Shape;206;g13c2ea6c5e8_0_0:notes"/>
+          <p:cNvSpPr/>
+          <p:nvPr>
+            <p:ph idx="2" type="sldImg"/>
+          </p:nvPr>
+        </p:nvSpPr>
+        <p:spPr>
+          <a:xfrm>
+            <a:off x="381300" y="685800"/>
+            <a:ext cx="6096000" cy="3429000"/>
+          </a:xfrm>
+          <a:custGeom>
+            <a:rect b="b" l="l" r="r" t="t"/>
+            <a:pathLst>
+              <a:path extrusionOk="0" h="120000" w="120000">
+                <a:moveTo>
+                  <a:pt x="0" y="0"/>
+                </a:moveTo>
+                <a:lnTo>
+                  <a:pt x="120000" y="0"/>
+                </a:lnTo>
+                <a:lnTo>
+                  <a:pt x="120000" y="120000"/>
+                </a:lnTo>
+                <a:lnTo>
+                  <a:pt x="0" y="120000"/>
+                </a:lnTo>
+                <a:close/>
+              </a:path>
+            </a:pathLst>
+          </a:custGeom>
+          <a:noFill/>
+          <a:ln cap="flat" cmpd="sng" w="9525">
+            <a:solidFill>
+              <a:srgbClr val="000000"/>
+            </a:solidFill>
+            <a:prstDash val="solid"/>
+            <a:round/>
+            <a:headEnd len="sm" w="sm" type="none"/>
+            <a:tailEnd len="sm" w="sm" type="none"/>
+          </a:ln>
+        </p:spPr>
+      </p:sp>
+      <p:sp>
+        <p:nvSpPr>
+          <p:cNvPr id="207" name="Google Shape;207;g13c2ea6c5e8_0_0:notes"/>
+          <p:cNvSpPr txBox="1"/>
+          <p:nvPr>
+            <p:ph idx="1" type="body"/>
+          </p:nvPr>
+        </p:nvSpPr>
+        <p:spPr>
+          <a:xfrm>
+            <a:off x="685800" y="4343400"/>
+            <a:ext cx="5486400" cy="4114800"/>
+          </a:xfrm>
+          <a:prstGeom prst="rect">
+            <a:avLst/>
+          </a:prstGeom>
+          <a:noFill/>
+          <a:ln>
+            <a:noFill/>
+          </a:ln>
+        </p:spPr>
+        <p:txBody>
+          <a:bodyPr anchorCtr="0" anchor="t" bIns="91425" lIns="91425" spcFirstLastPara="1" rIns="91425" wrap="square" tIns="91425">
+            <a:noAutofit/>
+          </a:bodyPr>
+          <a:lstStyle/>
+          <a:p>
+            <a:pPr indent="0" lvl="0" marL="0" rtl="0" algn="l">
+              <a:lnSpc>
+                <a:spcPct val="100000"/>
+              </a:lnSpc>
+              <a:spcBef>
+                <a:spcPts val="0"/>
+              </a:spcBef>
+              <a:spcAft>
+                <a:spcPts val="0"/>
+              </a:spcAft>
+              <a:buSzPts val="1100"/>
+              <a:buNone/>
+            </a:pPr>
+            <a:r>
+              <a:t/>
+            </a:r>
+            <a:endParaRPr/>
+          </a:p>
+        </p:txBody>
+      </p:sp>
+    </p:spTree>
+  </p:cSld>
+  <p:clrMapOvr>
+    <a:masterClrMapping/>
+  </p:clrMapOvr>
+</p:notes>
+</file>
+
+<file path=ppt/notesSlides/notesSlide14.xml><?xml version="1.0" encoding="utf-8"?>
+<p:notes xmlns:a="http://schemas.openxmlformats.org/drawingml/2006/main" xmlns:r="http://schemas.openxmlformats.org/officeDocument/2006/relationships" xmlns:mc="http://schemas.openxmlformats.org/markup-compatibility/2006" xmlns:mv="urn:schemas-microsoft-com:mac:vml" xmlns:p="http://schemas.openxmlformats.org/presentationml/2006/main" xmlns:c="http://schemas.openxmlformats.org/drawingml/2006/chart" xmlns:dgm="http://schemas.openxmlformats.org/drawingml/2006/diagram" xmlns:o="urn:schemas-microsoft-com:office:office" xmlns:v="urn:schemas-microsoft-com:vml" xmlns:pvml="urn:schemas-microsoft-com:office:powerpoint" xmlns:com="http://schemas.openxmlformats.org/drawingml/2006/compatibility" xmlns:p14="http://schemas.microsoft.com/office/powerpoint/2010/main" xmlns:p15="http://schemas.microsoft.com/office/powerpoint/2012/main" xmlns:ahyp="http://schemas.microsoft.com/office/drawing/2018/hyperlinkcolor" showMasterPhAnim="0" showMasterSp="0">
+  <p:cSld>
+    <p:spTree>
+      <p:nvGrpSpPr>
+        <p:cNvPr id="211" name="Shape 211"/>
+        <p:cNvGrpSpPr/>
+        <p:nvPr/>
+      </p:nvGrpSpPr>
+      <p:grpSpPr>
+        <a:xfrm>
+          <a:off x="0" y="0"/>
+          <a:ext cx="0" cy="0"/>
+          <a:chOff x="0" y="0"/>
+          <a:chExt cx="0" cy="0"/>
+        </a:xfrm>
+      </p:grpSpPr>
+      <p:sp>
+        <p:nvSpPr>
+          <p:cNvPr id="212" name="Google Shape;212;g13c2ea6c5e8_0_6:notes"/>
+          <p:cNvSpPr/>
+          <p:nvPr>
+            <p:ph idx="2" type="sldImg"/>
+          </p:nvPr>
+        </p:nvSpPr>
+        <p:spPr>
+          <a:xfrm>
+            <a:off x="381300" y="685800"/>
+            <a:ext cx="6096000" cy="3429000"/>
+          </a:xfrm>
+          <a:custGeom>
+            <a:rect b="b" l="l" r="r" t="t"/>
+            <a:pathLst>
+              <a:path extrusionOk="0" h="120000" w="120000">
+                <a:moveTo>
+                  <a:pt x="0" y="0"/>
+                </a:moveTo>
+                <a:lnTo>
+                  <a:pt x="120000" y="0"/>
+                </a:lnTo>
+                <a:lnTo>
+                  <a:pt x="120000" y="120000"/>
+                </a:lnTo>
+                <a:lnTo>
+                  <a:pt x="0" y="120000"/>
+                </a:lnTo>
+                <a:close/>
+              </a:path>
+            </a:pathLst>
+          </a:custGeom>
+        </p:spPr>
+      </p:sp>
+      <p:sp>
+        <p:nvSpPr>
+          <p:cNvPr id="213" name="Google Shape;213;g13c2ea6c5e8_0_6:notes"/>
+          <p:cNvSpPr txBox="1"/>
+          <p:nvPr>
+            <p:ph idx="1" type="body"/>
+          </p:nvPr>
+        </p:nvSpPr>
+        <p:spPr>
+          <a:xfrm>
+            <a:off x="685800" y="4343400"/>
+            <a:ext cx="5486400" cy="4114800"/>
+          </a:xfrm>
+          <a:prstGeom prst="rect">
+            <a:avLst/>
+          </a:prstGeom>
+        </p:spPr>
+        <p:txBody>
+          <a:bodyPr anchorCtr="0" anchor="t" bIns="91425" lIns="91425" spcFirstLastPara="1" rIns="91425" wrap="square" tIns="91425">
+            <a:noAutofit/>
+          </a:bodyPr>
+          <a:lstStyle/>
+          <a:p>
+            <a:pPr indent="0" lvl="0" marL="0" rtl="0" algn="l">
+              <a:spcBef>
+                <a:spcPts val="0"/>
+              </a:spcBef>
+              <a:spcAft>
+                <a:spcPts val="0"/>
+              </a:spcAft>
               <a:buNone/>
             </a:pPr>
             <a:r>
@@ -14914,6 +15132,301 @@
 </p:sld>
 </file>
 
+<file path=ppt/slides/slide13.xml><?xml version="1.0" encoding="utf-8"?>
+<p:sld xmlns:a="http://schemas.openxmlformats.org/drawingml/2006/main" xmlns:r="http://schemas.openxmlformats.org/officeDocument/2006/relationships" xmlns:mc="http://schemas.openxmlformats.org/markup-compatibility/2006" xmlns:mv="urn:schemas-microsoft-com:mac:vml" xmlns:p="http://schemas.openxmlformats.org/presentationml/2006/main" xmlns:c="http://schemas.openxmlformats.org/drawingml/2006/chart" xmlns:dgm="http://schemas.openxmlformats.org/drawingml/2006/diagram" xmlns:o="urn:schemas-microsoft-com:office:office" xmlns:v="urn:schemas-microsoft-com:vml" xmlns:pvml="urn:schemas-microsoft-com:office:powerpoint" xmlns:com="http://schemas.openxmlformats.org/drawingml/2006/compatibility" xmlns:p14="http://schemas.microsoft.com/office/powerpoint/2010/main" xmlns:p15="http://schemas.microsoft.com/office/powerpoint/2012/main" xmlns:ahyp="http://schemas.microsoft.com/office/drawing/2018/hyperlinkcolor">
+  <p:cSld>
+    <p:spTree>
+      <p:nvGrpSpPr>
+        <p:cNvPr id="208" name="Shape 208"/>
+        <p:cNvGrpSpPr/>
+        <p:nvPr/>
+      </p:nvGrpSpPr>
+      <p:grpSpPr>
+        <a:xfrm>
+          <a:off x="0" y="0"/>
+          <a:ext cx="0" cy="0"/>
+          <a:chOff x="0" y="0"/>
+          <a:chExt cx="0" cy="0"/>
+        </a:xfrm>
+      </p:grpSpPr>
+      <p:sp>
+        <p:nvSpPr>
+          <p:cNvPr id="209" name="Google Shape;209;g13c2ea6c5e8_0_0"/>
+          <p:cNvSpPr txBox="1"/>
+          <p:nvPr>
+            <p:ph type="title"/>
+          </p:nvPr>
+        </p:nvSpPr>
+        <p:spPr>
+          <a:xfrm>
+            <a:off x="1297500" y="393750"/>
+            <a:ext cx="7038900" cy="914100"/>
+          </a:xfrm>
+          <a:prstGeom prst="rect">
+            <a:avLst/>
+          </a:prstGeom>
+          <a:noFill/>
+          <a:ln>
+            <a:noFill/>
+          </a:ln>
+        </p:spPr>
+        <p:txBody>
+          <a:bodyPr anchorCtr="0" anchor="t" bIns="91425" lIns="91425" spcFirstLastPara="1" rIns="91425" wrap="square" tIns="91425">
+            <a:normAutofit/>
+          </a:bodyPr>
+          <a:lstStyle/>
+          <a:p>
+            <a:pPr indent="0" lvl="0" marL="0" rtl="0" algn="ctr">
+              <a:lnSpc>
+                <a:spcPct val="100000"/>
+              </a:lnSpc>
+              <a:spcBef>
+                <a:spcPts val="0"/>
+              </a:spcBef>
+              <a:spcAft>
+                <a:spcPts val="0"/>
+              </a:spcAft>
+              <a:buSzPts val="2400"/>
+              <a:buNone/>
+            </a:pPr>
+            <a:r>
+              <a:rPr lang="fr"/>
+              <a:t>Processus </a:t>
+            </a:r>
+            <a:r>
+              <a:rPr lang="fr"/>
+              <a:t>envoie</a:t>
+            </a:r>
+            <a:r>
+              <a:rPr lang="fr"/>
+              <a:t> </a:t>
+            </a:r>
+            <a:r>
+              <a:rPr lang="fr"/>
+              <a:t>mail</a:t>
+            </a:r>
+            <a:r>
+              <a:rPr lang="fr"/>
+              <a:t> </a:t>
+            </a:r>
+            <a:r>
+              <a:rPr lang="fr"/>
+              <a:t>automatique</a:t>
+            </a:r>
+            <a:endParaRPr/>
+          </a:p>
+        </p:txBody>
+      </p:sp>
+      <p:pic>
+        <p:nvPicPr>
+          <p:cNvPr id="210" name="Google Shape;210;g13c2ea6c5e8_0_0"/>
+          <p:cNvPicPr preferRelativeResize="0"/>
+          <p:nvPr/>
+        </p:nvPicPr>
+        <p:blipFill>
+          <a:blip r:embed="rId3">
+            <a:alphaModFix/>
+          </a:blip>
+          <a:stretch>
+            <a:fillRect/>
+          </a:stretch>
+        </p:blipFill>
+        <p:spPr>
+          <a:xfrm>
+            <a:off x="1433463" y="1307850"/>
+            <a:ext cx="6277066" cy="3530849"/>
+          </a:xfrm>
+          <a:prstGeom prst="rect">
+            <a:avLst/>
+          </a:prstGeom>
+          <a:noFill/>
+          <a:ln>
+            <a:noFill/>
+          </a:ln>
+        </p:spPr>
+      </p:pic>
+    </p:spTree>
+  </p:cSld>
+  <p:clrMapOvr>
+    <a:masterClrMapping/>
+  </p:clrMapOvr>
+</p:sld>
+</file>
+
+<file path=ppt/slides/slide14.xml><?xml version="1.0" encoding="utf-8"?>
+<p:sld xmlns:a="http://schemas.openxmlformats.org/drawingml/2006/main" xmlns:r="http://schemas.openxmlformats.org/officeDocument/2006/relationships" xmlns:mc="http://schemas.openxmlformats.org/markup-compatibility/2006" xmlns:mv="urn:schemas-microsoft-com:mac:vml" xmlns:p="http://schemas.openxmlformats.org/presentationml/2006/main" xmlns:c="http://schemas.openxmlformats.org/drawingml/2006/chart" xmlns:dgm="http://schemas.openxmlformats.org/drawingml/2006/diagram" xmlns:o="urn:schemas-microsoft-com:office:office" xmlns:v="urn:schemas-microsoft-com:vml" xmlns:pvml="urn:schemas-microsoft-com:office:powerpoint" xmlns:com="http://schemas.openxmlformats.org/drawingml/2006/compatibility" xmlns:p14="http://schemas.microsoft.com/office/powerpoint/2010/main" xmlns:p15="http://schemas.microsoft.com/office/powerpoint/2012/main" xmlns:ahyp="http://schemas.microsoft.com/office/drawing/2018/hyperlinkcolor">
+  <p:cSld>
+    <p:spTree>
+      <p:nvGrpSpPr>
+        <p:cNvPr id="214" name="Shape 214"/>
+        <p:cNvGrpSpPr/>
+        <p:nvPr/>
+      </p:nvGrpSpPr>
+      <p:grpSpPr>
+        <a:xfrm>
+          <a:off x="0" y="0"/>
+          <a:ext cx="0" cy="0"/>
+          <a:chOff x="0" y="0"/>
+          <a:chExt cx="0" cy="0"/>
+        </a:xfrm>
+      </p:grpSpPr>
+      <p:sp>
+        <p:nvSpPr>
+          <p:cNvPr id="215" name="Google Shape;215;g13c2ea6c5e8_0_6"/>
+          <p:cNvSpPr txBox="1"/>
+          <p:nvPr>
+            <p:ph type="title"/>
+          </p:nvPr>
+        </p:nvSpPr>
+        <p:spPr>
+          <a:xfrm>
+            <a:off x="1297500" y="393750"/>
+            <a:ext cx="7038900" cy="914100"/>
+          </a:xfrm>
+          <a:prstGeom prst="rect">
+            <a:avLst/>
+          </a:prstGeom>
+        </p:spPr>
+        <p:txBody>
+          <a:bodyPr anchorCtr="0" anchor="ctr" bIns="91425" lIns="91425" spcFirstLastPara="1" rIns="91425" wrap="square" tIns="91425">
+            <a:normAutofit/>
+          </a:bodyPr>
+          <a:lstStyle/>
+          <a:p>
+            <a:pPr indent="0" lvl="0" marL="0" rtl="0" algn="ctr">
+              <a:spcBef>
+                <a:spcPts val="0"/>
+              </a:spcBef>
+              <a:spcAft>
+                <a:spcPts val="0"/>
+              </a:spcAft>
+              <a:buNone/>
+            </a:pPr>
+            <a:r>
+              <a:rPr lang="fr"/>
+              <a:t>Démonstration d’un cas d’usage</a:t>
+            </a:r>
+            <a:endParaRPr/>
+          </a:p>
+        </p:txBody>
+      </p:sp>
+      <p:sp>
+        <p:nvSpPr>
+          <p:cNvPr id="216" name="Google Shape;216;g13c2ea6c5e8_0_6"/>
+          <p:cNvSpPr txBox="1"/>
+          <p:nvPr>
+            <p:ph idx="1" type="body"/>
+          </p:nvPr>
+        </p:nvSpPr>
+        <p:spPr>
+          <a:xfrm>
+            <a:off x="1297500" y="1567550"/>
+            <a:ext cx="7038900" cy="2911200"/>
+          </a:xfrm>
+          <a:prstGeom prst="rect">
+            <a:avLst/>
+          </a:prstGeom>
+        </p:spPr>
+        <p:txBody>
+          <a:bodyPr anchorCtr="0" anchor="ctr" bIns="91425" lIns="91425" spcFirstLastPara="1" rIns="91425" wrap="square" tIns="91425">
+            <a:normAutofit/>
+          </a:bodyPr>
+          <a:lstStyle/>
+          <a:p>
+            <a:pPr indent="-311150" lvl="0" marL="457200" rtl="0" algn="ctr">
+              <a:spcBef>
+                <a:spcPts val="0"/>
+              </a:spcBef>
+              <a:spcAft>
+                <a:spcPts val="0"/>
+              </a:spcAft>
+              <a:buSzPts val="1300"/>
+              <a:buChar char="-"/>
+            </a:pPr>
+            <a:r>
+              <a:rPr lang="fr"/>
+              <a:t>Démonstration de tous les points cités avec un prospect : </a:t>
+            </a:r>
+            <a:endParaRPr/>
+          </a:p>
+          <a:p>
+            <a:pPr indent="-298450" lvl="1" marL="914400" rtl="0" algn="ctr">
+              <a:spcBef>
+                <a:spcPts val="0"/>
+              </a:spcBef>
+              <a:spcAft>
+                <a:spcPts val="0"/>
+              </a:spcAft>
+              <a:buSzPts val="1100"/>
+              <a:buChar char="-"/>
+            </a:pPr>
+            <a:r>
+              <a:rPr lang="fr"/>
+              <a:t>Montrer l’envoie d’e-mail</a:t>
+            </a:r>
+            <a:endParaRPr/>
+          </a:p>
+          <a:p>
+            <a:pPr indent="-298450" lvl="1" marL="914400" rtl="0" algn="ctr">
+              <a:spcBef>
+                <a:spcPts val="0"/>
+              </a:spcBef>
+              <a:spcAft>
+                <a:spcPts val="0"/>
+              </a:spcAft>
+              <a:buSzPts val="1100"/>
+              <a:buChar char="-"/>
+            </a:pPr>
+            <a:r>
+              <a:rPr lang="fr"/>
+              <a:t>Montrer la décrémentation automatique du nombre de places disponibles</a:t>
+            </a:r>
+            <a:endParaRPr/>
+          </a:p>
+          <a:p>
+            <a:pPr indent="-298450" lvl="1" marL="914400" rtl="0" algn="ctr">
+              <a:spcBef>
+                <a:spcPts val="0"/>
+              </a:spcBef>
+              <a:spcAft>
+                <a:spcPts val="0"/>
+              </a:spcAft>
+              <a:buSzPts val="1100"/>
+              <a:buChar char="-"/>
+            </a:pPr>
+            <a:r>
+              <a:rPr lang="fr"/>
+              <a:t>Conversion du prospect</a:t>
+            </a:r>
+            <a:endParaRPr/>
+          </a:p>
+          <a:p>
+            <a:pPr indent="-298450" lvl="1" marL="914400" rtl="0" algn="ctr">
+              <a:spcBef>
+                <a:spcPts val="0"/>
+              </a:spcBef>
+              <a:spcAft>
+                <a:spcPts val="0"/>
+              </a:spcAft>
+              <a:buSzPts val="1100"/>
+              <a:buChar char="-"/>
+            </a:pPr>
+            <a:r>
+              <a:rPr lang="fr"/>
+              <a:t>Actualisation du tableau de bord</a:t>
+            </a:r>
+            <a:endParaRPr/>
+          </a:p>
+        </p:txBody>
+      </p:sp>
+    </p:spTree>
+  </p:cSld>
+  <p:clrMapOvr>
+    <a:masterClrMapping/>
+  </p:clrMapOvr>
+</p:sld>
+</file>
+
 <file path=ppt/slides/slide2.xml><?xml version="1.0" encoding="utf-8"?>
 <p:sld xmlns:a="http://schemas.openxmlformats.org/drawingml/2006/main" xmlns:r="http://schemas.openxmlformats.org/officeDocument/2006/relationships" xmlns:mc="http://schemas.openxmlformats.org/markup-compatibility/2006" xmlns:mv="urn:schemas-microsoft-com:mac:vml" xmlns:p="http://schemas.openxmlformats.org/presentationml/2006/main" xmlns:c="http://schemas.openxmlformats.org/drawingml/2006/chart" xmlns:dgm="http://schemas.openxmlformats.org/drawingml/2006/diagram" xmlns:o="urn:schemas-microsoft-com:office:office" xmlns:v="urn:schemas-microsoft-com:vml" xmlns:pvml="urn:schemas-microsoft-com:office:powerpoint" xmlns:com="http://schemas.openxmlformats.org/drawingml/2006/compatibility" xmlns:p14="http://schemas.microsoft.com/office/powerpoint/2010/main" xmlns:p15="http://schemas.microsoft.com/office/powerpoint/2012/main" xmlns:ahyp="http://schemas.microsoft.com/office/drawing/2018/hyperlinkcolor">
   <p:cSld>
@@ -15622,12 +16135,21 @@
                 <a:cs typeface="Montserrat"/>
                 <a:sym typeface="Montserrat"/>
               </a:rPr>
-              <a:t> le directeur</a:t>
+              <a:t> </a:t>
+            </a:r>
+            <a:r>
+              <a:rPr lang="fr" sz="1200">
+                <a:highlight>
+                  <a:schemeClr val="dk1"/>
+                </a:highlight>
+                <a:latin typeface="Montserrat"/>
+                <a:ea typeface="Montserrat"/>
+                <a:cs typeface="Montserrat"/>
+                <a:sym typeface="Montserrat"/>
+              </a:rPr>
+              <a:t>le directeur</a:t>
             </a:r>
             <a:endParaRPr>
-              <a:solidFill>
-                <a:schemeClr val="dk1"/>
-              </a:solidFill>
               <a:highlight>
                 <a:schemeClr val="dk1"/>
               </a:highlight>

</xml_diff>

<commit_message>
video demo et finalisation présentation
</commit_message>
<xml_diff>
--- a/projet_3_solution_tours_fors_life/livrables/P3_lignereux_steven/P3_01_presentation.pptx
+++ b/projet_3_solution_tours_fors_life/livrables/P3_lignereux_steven/P3_01_presentation.pptx
@@ -286,7 +286,7 @@
       </p15:sldGuideLst>
     </p:ext>
     <p:ext uri="http://customooxmlschemas.google.com/">
-      <go:slidesCustomData xmlns:go="http://customooxmlschemas.google.com/" r:id="rId28" roundtripDataSignature="AMtx7mgyh4c7JkrN0tUtgYqeFJCYxHklbQ=="/>
+      <go:slidesCustomData xmlns:go="http://customooxmlschemas.google.com/" r:id="rId28" roundtripDataSignature="AMtx7mihK7CNAV7G3eAR+VoUWZMyvzN3kQ=="/>
     </p:ext>
   </p:extLst>
 </p:presentation>
@@ -14972,7 +14972,7 @@
         </p:spPr>
         <p:txBody>
           <a:bodyPr anchorCtr="0" anchor="t" bIns="91425" lIns="91425" spcFirstLastPara="1" rIns="91425" wrap="square" tIns="91425">
-            <a:normAutofit/>
+            <a:normAutofit fontScale="90000"/>
           </a:bodyPr>
           <a:lstStyle/>
           <a:p>
@@ -14986,12 +14986,12 @@
               <a:spcAft>
                 <a:spcPts val="0"/>
               </a:spcAft>
-              <a:buSzPts val="2400"/>
+              <a:buSzPct val="100000"/>
               <a:buNone/>
             </a:pPr>
             <a:r>
               <a:rPr lang="fr"/>
-              <a:t>Rendre un champ obligatoire</a:t>
+              <a:t>Rendre un champ obligatoire a modifier pour le layout</a:t>
             </a:r>
             <a:endParaRPr/>
           </a:p>
@@ -15003,17 +15003,18 @@
           <p:cNvPicPr preferRelativeResize="0"/>
           <p:nvPr/>
         </p:nvPicPr>
-        <p:blipFill rotWithShape="1">
+        <p:blipFill>
           <a:blip r:embed="rId3">
             <a:alphaModFix/>
           </a:blip>
-          <a:srcRect b="0" l="0" r="0" t="0"/>
-          <a:stretch/>
+          <a:stretch>
+            <a:fillRect/>
+          </a:stretch>
         </p:blipFill>
         <p:spPr>
           <a:xfrm>
-            <a:off x="1175575" y="1155450"/>
-            <a:ext cx="6792845" cy="3820975"/>
+            <a:off x="1433463" y="1416225"/>
+            <a:ext cx="6277066" cy="3530849"/>
           </a:xfrm>
           <a:prstGeom prst="rect">
             <a:avLst/>
@@ -16559,6 +16560,285 @@
 </file>
 
 <file path=ppt/theme/theme1.xml><?xml version="1.0" encoding="utf-8"?>
+<a:theme xmlns:a="http://schemas.openxmlformats.org/drawingml/2006/main" xmlns:r="http://schemas.openxmlformats.org/officeDocument/2006/relationships" name="Focus">
+  <a:themeElements>
+    <a:clrScheme name="Focus">
+      <a:dk1>
+        <a:srgbClr val="1B212C"/>
+      </a:dk1>
+      <a:lt1>
+        <a:srgbClr val="FFFFFF"/>
+      </a:lt1>
+      <a:dk2>
+        <a:srgbClr val="D9D9D9"/>
+      </a:dk2>
+      <a:lt2>
+        <a:srgbClr val="82C7A5"/>
+      </a:lt2>
+      <a:accent1>
+        <a:srgbClr val="0145AC"/>
+      </a:accent1>
+      <a:accent2>
+        <a:srgbClr val="EECE1A"/>
+      </a:accent2>
+      <a:accent3>
+        <a:srgbClr val="4E5567"/>
+      </a:accent3>
+      <a:accent4>
+        <a:srgbClr val="F4D6AD"/>
+      </a:accent4>
+      <a:accent5>
+        <a:srgbClr val="7890CD"/>
+      </a:accent5>
+      <a:accent6>
+        <a:srgbClr val="F15E22"/>
+      </a:accent6>
+      <a:hlink>
+        <a:srgbClr val="7890CD"/>
+      </a:hlink>
+      <a:folHlink>
+        <a:srgbClr val="7890CD"/>
+      </a:folHlink>
+    </a:clrScheme>
+    <a:fontScheme name="Office">
+      <a:majorFont>
+        <a:latin typeface="Arial"/>
+        <a:ea typeface=""/>
+        <a:cs typeface=""/>
+        <a:font script="Jpan" typeface="ＭＳ Ｐゴシック"/>
+        <a:font script="Hang" typeface="맑은 고딕"/>
+        <a:font script="Hans" typeface="宋体"/>
+        <a:font script="Hant" typeface="新細明體"/>
+        <a:font script="Arab" typeface="Times New Roman"/>
+        <a:font script="Hebr" typeface="Times New Roman"/>
+        <a:font script="Thai" typeface="Angsana New"/>
+        <a:font script="Ethi" typeface="Nyala"/>
+        <a:font script="Beng" typeface="Vrinda"/>
+        <a:font script="Gujr" typeface="Shruti"/>
+        <a:font script="Khmr" typeface="MoolBoran"/>
+        <a:font script="Knda" typeface="Tunga"/>
+        <a:font script="Guru" typeface="Raavi"/>
+        <a:font script="Cans" typeface="Euphemia"/>
+        <a:font script="Cher" typeface="Plantagenet Cherokee"/>
+        <a:font script="Yiii" typeface="Microsoft Yi Baiti"/>
+        <a:font script="Tibt" typeface="Microsoft Himalaya"/>
+        <a:font script="Thaa" typeface="MV Boli"/>
+        <a:font script="Deva" typeface="Mangal"/>
+        <a:font script="Telu" typeface="Gautami"/>
+        <a:font script="Taml" typeface="Latha"/>
+        <a:font script="Syrc" typeface="Estrangelo Edessa"/>
+        <a:font script="Orya" typeface="Kalinga"/>
+        <a:font script="Mlym" typeface="Kartika"/>
+        <a:font script="Laoo" typeface="DokChampa"/>
+        <a:font script="Sinh" typeface="Iskoola Pota"/>
+        <a:font script="Mong" typeface="Mongolian Baiti"/>
+        <a:font script="Viet" typeface="Times New Roman"/>
+        <a:font script="Uigh" typeface="Microsoft Uighur"/>
+        <a:font script="Geor" typeface="Sylfaen"/>
+      </a:majorFont>
+      <a:minorFont>
+        <a:latin typeface="Arial"/>
+        <a:ea typeface=""/>
+        <a:cs typeface=""/>
+        <a:font script="Jpan" typeface="ＭＳ Ｐゴシック"/>
+        <a:font script="Hang" typeface="맑은 고딕"/>
+        <a:font script="Hans" typeface="宋体"/>
+        <a:font script="Hant" typeface="新細明體"/>
+        <a:font script="Arab" typeface="Arial"/>
+        <a:font script="Hebr" typeface="Arial"/>
+        <a:font script="Thai" typeface="Cordia New"/>
+        <a:font script="Ethi" typeface="Nyala"/>
+        <a:font script="Beng" typeface="Vrinda"/>
+        <a:font script="Gujr" typeface="Shruti"/>
+        <a:font script="Khmr" typeface="DaunPenh"/>
+        <a:font script="Knda" typeface="Tunga"/>
+        <a:font script="Guru" typeface="Raavi"/>
+        <a:font script="Cans" typeface="Euphemia"/>
+        <a:font script="Cher" typeface="Plantagenet Cherokee"/>
+        <a:font script="Yiii" typeface="Microsoft Yi Baiti"/>
+        <a:font script="Tibt" typeface="Microsoft Himalaya"/>
+        <a:font script="Thaa" typeface="MV Boli"/>
+        <a:font script="Deva" typeface="Mangal"/>
+        <a:font script="Telu" typeface="Gautami"/>
+        <a:font script="Taml" typeface="Latha"/>
+        <a:font script="Syrc" typeface="Estrangelo Edessa"/>
+        <a:font script="Orya" typeface="Kalinga"/>
+        <a:font script="Mlym" typeface="Kartika"/>
+        <a:font script="Laoo" typeface="DokChampa"/>
+        <a:font script="Sinh" typeface="Iskoola Pota"/>
+        <a:font script="Mong" typeface="Mongolian Baiti"/>
+        <a:font script="Viet" typeface="Arial"/>
+        <a:font script="Uigh" typeface="Microsoft Uighur"/>
+        <a:font script="Geor" typeface="Sylfaen"/>
+      </a:minorFont>
+    </a:fontScheme>
+    <a:fmtScheme name="Office">
+      <a:fillStyleLst>
+        <a:solidFill>
+          <a:schemeClr val="phClr"/>
+        </a:solidFill>
+        <a:gradFill rotWithShape="1">
+          <a:gsLst>
+            <a:gs pos="0">
+              <a:schemeClr val="phClr">
+                <a:tint val="50000"/>
+                <a:satMod val="300000"/>
+              </a:schemeClr>
+            </a:gs>
+            <a:gs pos="35000">
+              <a:schemeClr val="phClr">
+                <a:tint val="37000"/>
+                <a:satMod val="300000"/>
+              </a:schemeClr>
+            </a:gs>
+            <a:gs pos="100000">
+              <a:schemeClr val="phClr">
+                <a:tint val="15000"/>
+                <a:satMod val="350000"/>
+              </a:schemeClr>
+            </a:gs>
+          </a:gsLst>
+          <a:lin ang="16200000" scaled="1"/>
+        </a:gradFill>
+        <a:gradFill rotWithShape="1">
+          <a:gsLst>
+            <a:gs pos="0">
+              <a:schemeClr val="phClr">
+                <a:tint val="100000"/>
+                <a:shade val="100000"/>
+                <a:satMod val="130000"/>
+              </a:schemeClr>
+            </a:gs>
+            <a:gs pos="100000">
+              <a:schemeClr val="phClr">
+                <a:tint val="50000"/>
+                <a:shade val="100000"/>
+                <a:satMod val="350000"/>
+              </a:schemeClr>
+            </a:gs>
+          </a:gsLst>
+          <a:lin ang="16200000" scaled="0"/>
+        </a:gradFill>
+      </a:fillStyleLst>
+      <a:lnStyleLst>
+        <a:ln w="9525" cap="flat" cmpd="sng" algn="ctr">
+          <a:solidFill>
+            <a:schemeClr val="phClr">
+              <a:shade val="95000"/>
+              <a:satMod val="105000"/>
+            </a:schemeClr>
+          </a:solidFill>
+          <a:prstDash val="solid"/>
+        </a:ln>
+        <a:ln w="25400" cap="flat" cmpd="sng" algn="ctr">
+          <a:solidFill>
+            <a:schemeClr val="phClr"/>
+          </a:solidFill>
+          <a:prstDash val="solid"/>
+        </a:ln>
+        <a:ln w="38100" cap="flat" cmpd="sng" algn="ctr">
+          <a:solidFill>
+            <a:schemeClr val="phClr"/>
+          </a:solidFill>
+          <a:prstDash val="solid"/>
+        </a:ln>
+      </a:lnStyleLst>
+      <a:effectStyleLst>
+        <a:effectStyle>
+          <a:effectLst>
+            <a:outerShdw blurRad="40000" dist="20000" dir="5400000" rotWithShape="0">
+              <a:srgbClr val="000000">
+                <a:alpha val="38000"/>
+              </a:srgbClr>
+            </a:outerShdw>
+          </a:effectLst>
+        </a:effectStyle>
+        <a:effectStyle>
+          <a:effectLst>
+            <a:outerShdw blurRad="40000" dist="23000" dir="5400000" rotWithShape="0">
+              <a:srgbClr val="000000">
+                <a:alpha val="35000"/>
+              </a:srgbClr>
+            </a:outerShdw>
+          </a:effectLst>
+        </a:effectStyle>
+        <a:effectStyle>
+          <a:effectLst>
+            <a:outerShdw blurRad="40000" dist="23000" dir="5400000" rotWithShape="0">
+              <a:srgbClr val="000000">
+                <a:alpha val="35000"/>
+              </a:srgbClr>
+            </a:outerShdw>
+          </a:effectLst>
+          <a:scene3d>
+            <a:camera prst="orthographicFront">
+              <a:rot lat="0" lon="0" rev="0"/>
+            </a:camera>
+            <a:lightRig rig="threePt" dir="t">
+              <a:rot lat="0" lon="0" rev="1200000"/>
+            </a:lightRig>
+          </a:scene3d>
+          <a:sp3d>
+            <a:bevelT w="63500" h="25400"/>
+          </a:sp3d>
+        </a:effectStyle>
+      </a:effectStyleLst>
+      <a:bgFillStyleLst>
+        <a:solidFill>
+          <a:schemeClr val="phClr"/>
+        </a:solidFill>
+        <a:gradFill rotWithShape="1">
+          <a:gsLst>
+            <a:gs pos="0">
+              <a:schemeClr val="phClr">
+                <a:tint val="40000"/>
+                <a:satMod val="350000"/>
+              </a:schemeClr>
+            </a:gs>
+            <a:gs pos="40000">
+              <a:schemeClr val="phClr">
+                <a:tint val="45000"/>
+                <a:shade val="99000"/>
+                <a:satMod val="350000"/>
+              </a:schemeClr>
+            </a:gs>
+            <a:gs pos="100000">
+              <a:schemeClr val="phClr">
+                <a:shade val="20000"/>
+                <a:satMod val="255000"/>
+              </a:schemeClr>
+            </a:gs>
+          </a:gsLst>
+          <a:path path="circle">
+            <a:fillToRect l="50000" t="-80000" r="50000" b="180000"/>
+          </a:path>
+        </a:gradFill>
+        <a:gradFill rotWithShape="1">
+          <a:gsLst>
+            <a:gs pos="0">
+              <a:schemeClr val="phClr">
+                <a:tint val="80000"/>
+                <a:satMod val="300000"/>
+              </a:schemeClr>
+            </a:gs>
+            <a:gs pos="100000">
+              <a:schemeClr val="phClr">
+                <a:shade val="30000"/>
+                <a:satMod val="200000"/>
+              </a:schemeClr>
+            </a:gs>
+          </a:gsLst>
+          <a:path path="circle">
+            <a:fillToRect l="50000" t="50000" r="50000" b="50000"/>
+          </a:path>
+        </a:gradFill>
+      </a:bgFillStyleLst>
+    </a:fmtScheme>
+  </a:themeElements>
+</a:theme>
+</file>
+
+<file path=ppt/theme/theme2.xml><?xml version="1.0" encoding="utf-8"?>
 <a:theme xmlns:a="http://schemas.openxmlformats.org/drawingml/2006/main" xmlns:r="http://schemas.openxmlformats.org/officeDocument/2006/relationships">
   <a:themeElements>
     <a:clrScheme name="Default">
@@ -16835,283 +17115,4 @@
     </a:fmtScheme>
   </a:themeElements>
 </a:theme>
-</file>
-
-<file path=ppt/theme/theme2.xml><?xml version="1.0" encoding="utf-8"?>
-<a:theme xmlns:a="http://schemas.openxmlformats.org/drawingml/2006/main" xmlns:r="http://schemas.openxmlformats.org/officeDocument/2006/relationships" name="Focus">
-  <a:themeElements>
-    <a:clrScheme name="Focus">
-      <a:dk1>
-        <a:srgbClr val="1B212C"/>
-      </a:dk1>
-      <a:lt1>
-        <a:srgbClr val="FFFFFF"/>
-      </a:lt1>
-      <a:dk2>
-        <a:srgbClr val="D9D9D9"/>
-      </a:dk2>
-      <a:lt2>
-        <a:srgbClr val="82C7A5"/>
-      </a:lt2>
-      <a:accent1>
-        <a:srgbClr val="0145AC"/>
-      </a:accent1>
-      <a:accent2>
-        <a:srgbClr val="EECE1A"/>
-      </a:accent2>
-      <a:accent3>
-        <a:srgbClr val="4E5567"/>
-      </a:accent3>
-      <a:accent4>
-        <a:srgbClr val="F4D6AD"/>
-      </a:accent4>
-      <a:accent5>
-        <a:srgbClr val="7890CD"/>
-      </a:accent5>
-      <a:accent6>
-        <a:srgbClr val="F15E22"/>
-      </a:accent6>
-      <a:hlink>
-        <a:srgbClr val="7890CD"/>
-      </a:hlink>
-      <a:folHlink>
-        <a:srgbClr val="7890CD"/>
-      </a:folHlink>
-    </a:clrScheme>
-    <a:fontScheme name="Office">
-      <a:majorFont>
-        <a:latin typeface="Arial"/>
-        <a:ea typeface=""/>
-        <a:cs typeface=""/>
-        <a:font script="Jpan" typeface="ＭＳ Ｐゴシック"/>
-        <a:font script="Hang" typeface="맑은 고딕"/>
-        <a:font script="Hans" typeface="宋体"/>
-        <a:font script="Hant" typeface="新細明體"/>
-        <a:font script="Arab" typeface="Times New Roman"/>
-        <a:font script="Hebr" typeface="Times New Roman"/>
-        <a:font script="Thai" typeface="Angsana New"/>
-        <a:font script="Ethi" typeface="Nyala"/>
-        <a:font script="Beng" typeface="Vrinda"/>
-        <a:font script="Gujr" typeface="Shruti"/>
-        <a:font script="Khmr" typeface="MoolBoran"/>
-        <a:font script="Knda" typeface="Tunga"/>
-        <a:font script="Guru" typeface="Raavi"/>
-        <a:font script="Cans" typeface="Euphemia"/>
-        <a:font script="Cher" typeface="Plantagenet Cherokee"/>
-        <a:font script="Yiii" typeface="Microsoft Yi Baiti"/>
-        <a:font script="Tibt" typeface="Microsoft Himalaya"/>
-        <a:font script="Thaa" typeface="MV Boli"/>
-        <a:font script="Deva" typeface="Mangal"/>
-        <a:font script="Telu" typeface="Gautami"/>
-        <a:font script="Taml" typeface="Latha"/>
-        <a:font script="Syrc" typeface="Estrangelo Edessa"/>
-        <a:font script="Orya" typeface="Kalinga"/>
-        <a:font script="Mlym" typeface="Kartika"/>
-        <a:font script="Laoo" typeface="DokChampa"/>
-        <a:font script="Sinh" typeface="Iskoola Pota"/>
-        <a:font script="Mong" typeface="Mongolian Baiti"/>
-        <a:font script="Viet" typeface="Times New Roman"/>
-        <a:font script="Uigh" typeface="Microsoft Uighur"/>
-        <a:font script="Geor" typeface="Sylfaen"/>
-      </a:majorFont>
-      <a:minorFont>
-        <a:latin typeface="Arial"/>
-        <a:ea typeface=""/>
-        <a:cs typeface=""/>
-        <a:font script="Jpan" typeface="ＭＳ Ｐゴシック"/>
-        <a:font script="Hang" typeface="맑은 고딕"/>
-        <a:font script="Hans" typeface="宋体"/>
-        <a:font script="Hant" typeface="新細明體"/>
-        <a:font script="Arab" typeface="Arial"/>
-        <a:font script="Hebr" typeface="Arial"/>
-        <a:font script="Thai" typeface="Cordia New"/>
-        <a:font script="Ethi" typeface="Nyala"/>
-        <a:font script="Beng" typeface="Vrinda"/>
-        <a:font script="Gujr" typeface="Shruti"/>
-        <a:font script="Khmr" typeface="DaunPenh"/>
-        <a:font script="Knda" typeface="Tunga"/>
-        <a:font script="Guru" typeface="Raavi"/>
-        <a:font script="Cans" typeface="Euphemia"/>
-        <a:font script="Cher" typeface="Plantagenet Cherokee"/>
-        <a:font script="Yiii" typeface="Microsoft Yi Baiti"/>
-        <a:font script="Tibt" typeface="Microsoft Himalaya"/>
-        <a:font script="Thaa" typeface="MV Boli"/>
-        <a:font script="Deva" typeface="Mangal"/>
-        <a:font script="Telu" typeface="Gautami"/>
-        <a:font script="Taml" typeface="Latha"/>
-        <a:font script="Syrc" typeface="Estrangelo Edessa"/>
-        <a:font script="Orya" typeface="Kalinga"/>
-        <a:font script="Mlym" typeface="Kartika"/>
-        <a:font script="Laoo" typeface="DokChampa"/>
-        <a:font script="Sinh" typeface="Iskoola Pota"/>
-        <a:font script="Mong" typeface="Mongolian Baiti"/>
-        <a:font script="Viet" typeface="Arial"/>
-        <a:font script="Uigh" typeface="Microsoft Uighur"/>
-        <a:font script="Geor" typeface="Sylfaen"/>
-      </a:minorFont>
-    </a:fontScheme>
-    <a:fmtScheme name="Office">
-      <a:fillStyleLst>
-        <a:solidFill>
-          <a:schemeClr val="phClr"/>
-        </a:solidFill>
-        <a:gradFill rotWithShape="1">
-          <a:gsLst>
-            <a:gs pos="0">
-              <a:schemeClr val="phClr">
-                <a:tint val="50000"/>
-                <a:satMod val="300000"/>
-              </a:schemeClr>
-            </a:gs>
-            <a:gs pos="35000">
-              <a:schemeClr val="phClr">
-                <a:tint val="37000"/>
-                <a:satMod val="300000"/>
-              </a:schemeClr>
-            </a:gs>
-            <a:gs pos="100000">
-              <a:schemeClr val="phClr">
-                <a:tint val="15000"/>
-                <a:satMod val="350000"/>
-              </a:schemeClr>
-            </a:gs>
-          </a:gsLst>
-          <a:lin ang="16200000" scaled="1"/>
-        </a:gradFill>
-        <a:gradFill rotWithShape="1">
-          <a:gsLst>
-            <a:gs pos="0">
-              <a:schemeClr val="phClr">
-                <a:tint val="100000"/>
-                <a:shade val="100000"/>
-                <a:satMod val="130000"/>
-              </a:schemeClr>
-            </a:gs>
-            <a:gs pos="100000">
-              <a:schemeClr val="phClr">
-                <a:tint val="50000"/>
-                <a:shade val="100000"/>
-                <a:satMod val="350000"/>
-              </a:schemeClr>
-            </a:gs>
-          </a:gsLst>
-          <a:lin ang="16200000" scaled="0"/>
-        </a:gradFill>
-      </a:fillStyleLst>
-      <a:lnStyleLst>
-        <a:ln w="9525" cap="flat" cmpd="sng" algn="ctr">
-          <a:solidFill>
-            <a:schemeClr val="phClr">
-              <a:shade val="95000"/>
-              <a:satMod val="105000"/>
-            </a:schemeClr>
-          </a:solidFill>
-          <a:prstDash val="solid"/>
-        </a:ln>
-        <a:ln w="25400" cap="flat" cmpd="sng" algn="ctr">
-          <a:solidFill>
-            <a:schemeClr val="phClr"/>
-          </a:solidFill>
-          <a:prstDash val="solid"/>
-        </a:ln>
-        <a:ln w="38100" cap="flat" cmpd="sng" algn="ctr">
-          <a:solidFill>
-            <a:schemeClr val="phClr"/>
-          </a:solidFill>
-          <a:prstDash val="solid"/>
-        </a:ln>
-      </a:lnStyleLst>
-      <a:effectStyleLst>
-        <a:effectStyle>
-          <a:effectLst>
-            <a:outerShdw blurRad="40000" dist="20000" dir="5400000" rotWithShape="0">
-              <a:srgbClr val="000000">
-                <a:alpha val="38000"/>
-              </a:srgbClr>
-            </a:outerShdw>
-          </a:effectLst>
-        </a:effectStyle>
-        <a:effectStyle>
-          <a:effectLst>
-            <a:outerShdw blurRad="40000" dist="23000" dir="5400000" rotWithShape="0">
-              <a:srgbClr val="000000">
-                <a:alpha val="35000"/>
-              </a:srgbClr>
-            </a:outerShdw>
-          </a:effectLst>
-        </a:effectStyle>
-        <a:effectStyle>
-          <a:effectLst>
-            <a:outerShdw blurRad="40000" dist="23000" dir="5400000" rotWithShape="0">
-              <a:srgbClr val="000000">
-                <a:alpha val="35000"/>
-              </a:srgbClr>
-            </a:outerShdw>
-          </a:effectLst>
-          <a:scene3d>
-            <a:camera prst="orthographicFront">
-              <a:rot lat="0" lon="0" rev="0"/>
-            </a:camera>
-            <a:lightRig rig="threePt" dir="t">
-              <a:rot lat="0" lon="0" rev="1200000"/>
-            </a:lightRig>
-          </a:scene3d>
-          <a:sp3d>
-            <a:bevelT w="63500" h="25400"/>
-          </a:sp3d>
-        </a:effectStyle>
-      </a:effectStyleLst>
-      <a:bgFillStyleLst>
-        <a:solidFill>
-          <a:schemeClr val="phClr"/>
-        </a:solidFill>
-        <a:gradFill rotWithShape="1">
-          <a:gsLst>
-            <a:gs pos="0">
-              <a:schemeClr val="phClr">
-                <a:tint val="40000"/>
-                <a:satMod val="350000"/>
-              </a:schemeClr>
-            </a:gs>
-            <a:gs pos="40000">
-              <a:schemeClr val="phClr">
-                <a:tint val="45000"/>
-                <a:shade val="99000"/>
-                <a:satMod val="350000"/>
-              </a:schemeClr>
-            </a:gs>
-            <a:gs pos="100000">
-              <a:schemeClr val="phClr">
-                <a:shade val="20000"/>
-                <a:satMod val="255000"/>
-              </a:schemeClr>
-            </a:gs>
-          </a:gsLst>
-          <a:path path="circle">
-            <a:fillToRect l="50000" t="-80000" r="50000" b="180000"/>
-          </a:path>
-        </a:gradFill>
-        <a:gradFill rotWithShape="1">
-          <a:gsLst>
-            <a:gs pos="0">
-              <a:schemeClr val="phClr">
-                <a:tint val="80000"/>
-                <a:satMod val="300000"/>
-              </a:schemeClr>
-            </a:gs>
-            <a:gs pos="100000">
-              <a:schemeClr val="phClr">
-                <a:shade val="30000"/>
-                <a:satMod val="200000"/>
-              </a:schemeClr>
-            </a:gs>
-          </a:gsLst>
-          <a:path path="circle">
-            <a:fillToRect l="50000" t="50000" r="50000" b="50000"/>
-          </a:path>
-        </a:gradFill>
-      </a:bgFillStyleLst>
-    </a:fmtScheme>
-  </a:themeElements>
-</a:theme>
 </file>
</xml_diff>

<commit_message>
modifications livrables après soutenance
</commit_message>
<xml_diff>
--- a/projet_3_solution_tours_fors_life/livrables/P3_lignereux_steven/P3_01_presentation.pptx
+++ b/projet_3_solution_tours_fors_life/livrables/P3_lignereux_steven/P3_01_presentation.pptx
@@ -22,23 +22,25 @@
     <p:sldId id="267" r:id="rId17"/>
     <p:sldId id="268" r:id="rId18"/>
     <p:sldId id="269" r:id="rId19"/>
+    <p:sldId id="270" r:id="rId20"/>
+    <p:sldId id="271" r:id="rId21"/>
   </p:sldIdLst>
   <p:sldSz cy="5143500" cx="9144000"/>
   <p:notesSz cx="6858000" cy="9144000"/>
   <p:embeddedFontLst>
     <p:embeddedFont>
       <p:font typeface="Montserrat"/>
-      <p:regular r:id="rId20"/>
-      <p:bold r:id="rId21"/>
-      <p:italic r:id="rId22"/>
-      <p:boldItalic r:id="rId23"/>
+      <p:regular r:id="rId22"/>
+      <p:bold r:id="rId23"/>
+      <p:italic r:id="rId24"/>
+      <p:boldItalic r:id="rId25"/>
     </p:embeddedFont>
     <p:embeddedFont>
       <p:font typeface="Lato"/>
-      <p:regular r:id="rId24"/>
-      <p:bold r:id="rId25"/>
-      <p:italic r:id="rId26"/>
-      <p:boldItalic r:id="rId27"/>
+      <p:regular r:id="rId26"/>
+      <p:bold r:id="rId27"/>
+      <p:italic r:id="rId28"/>
+      <p:boldItalic r:id="rId29"/>
     </p:embeddedFont>
   </p:embeddedFontLst>
   <p:defaultTextStyle>
@@ -286,7 +288,7 @@
       </p15:sldGuideLst>
     </p:ext>
     <p:ext uri="http://customooxmlschemas.google.com/">
-      <go:slidesCustomData xmlns:go="http://customooxmlschemas.google.com/" r:id="rId28" roundtripDataSignature="AMtx7mihK7CNAV7G3eAR+VoUWZMyvzN3kQ=="/>
+      <go:slidesCustomData xmlns:go="http://customooxmlschemas.google.com/" r:id="rId30" roundtripDataSignature="AMtx7mhTY4+Xxt74baeanJR2359R47CVjw=="/>
     </p:ext>
   </p:extLst>
 </p:presentation>
@@ -1106,7 +1108,7 @@
       </p:grpSpPr>
       <p:sp>
         <p:nvSpPr>
-          <p:cNvPr id="194" name="Google Shape;194;p13:notes"/>
+          <p:cNvPr id="194" name="Google Shape;194;g13ef684d110_0_0:notes"/>
           <p:cNvSpPr/>
           <p:nvPr>
             <p:ph idx="2" type="sldImg"/>
@@ -1151,7 +1153,7 @@
       </p:sp>
       <p:sp>
         <p:nvSpPr>
-          <p:cNvPr id="195" name="Google Shape;195;p13:notes"/>
+          <p:cNvPr id="195" name="Google Shape;195;g13ef684d110_0_0:notes"/>
           <p:cNvSpPr txBox="1"/>
           <p:nvPr>
             <p:ph idx="1" type="body"/>
@@ -1209,7 +1211,7 @@
   <p:cSld>
     <p:spTree>
       <p:nvGrpSpPr>
-        <p:cNvPr id="199" name="Shape 199"/>
+        <p:cNvPr id="200" name="Shape 200"/>
         <p:cNvGrpSpPr/>
         <p:nvPr/>
       </p:nvGrpSpPr>
@@ -1223,7 +1225,7 @@
       </p:grpSpPr>
       <p:sp>
         <p:nvSpPr>
-          <p:cNvPr id="200" name="Google Shape;200;p14:notes"/>
+          <p:cNvPr id="201" name="Google Shape;201;g13ef684d110_0_12:notes"/>
           <p:cNvSpPr/>
           <p:nvPr>
             <p:ph idx="2" type="sldImg"/>
@@ -1268,7 +1270,7 @@
       </p:sp>
       <p:sp>
         <p:nvSpPr>
-          <p:cNvPr id="201" name="Google Shape;201;p14:notes"/>
+          <p:cNvPr id="202" name="Google Shape;202;g13ef684d110_0_12:notes"/>
           <p:cNvSpPr txBox="1"/>
           <p:nvPr>
             <p:ph idx="1" type="body"/>
@@ -1326,7 +1328,7 @@
   <p:cSld>
     <p:spTree>
       <p:nvGrpSpPr>
-        <p:cNvPr id="205" name="Shape 205"/>
+        <p:cNvPr id="207" name="Shape 207"/>
         <p:cNvGrpSpPr/>
         <p:nvPr/>
       </p:nvGrpSpPr>
@@ -1340,7 +1342,7 @@
       </p:grpSpPr>
       <p:sp>
         <p:nvSpPr>
-          <p:cNvPr id="206" name="Google Shape;206;g13c2ea6c5e8_0_0:notes"/>
+          <p:cNvPr id="208" name="Google Shape;208;p13:notes"/>
           <p:cNvSpPr/>
           <p:nvPr>
             <p:ph idx="2" type="sldImg"/>
@@ -1385,7 +1387,7 @@
       </p:sp>
       <p:sp>
         <p:nvSpPr>
-          <p:cNvPr id="207" name="Google Shape;207;g13c2ea6c5e8_0_0:notes"/>
+          <p:cNvPr id="209" name="Google Shape;209;p13:notes"/>
           <p:cNvSpPr txBox="1"/>
           <p:nvPr>
             <p:ph idx="1" type="body"/>
@@ -1443,7 +1445,7 @@
   <p:cSld>
     <p:spTree>
       <p:nvGrpSpPr>
-        <p:cNvPr id="211" name="Shape 211"/>
+        <p:cNvPr id="213" name="Shape 213"/>
         <p:cNvGrpSpPr/>
         <p:nvPr/>
       </p:nvGrpSpPr>
@@ -1457,7 +1459,241 @@
       </p:grpSpPr>
       <p:sp>
         <p:nvSpPr>
-          <p:cNvPr id="212" name="Google Shape;212;g13c2ea6c5e8_0_6:notes"/>
+          <p:cNvPr id="214" name="Google Shape;214;p14:notes"/>
+          <p:cNvSpPr/>
+          <p:nvPr>
+            <p:ph idx="2" type="sldImg"/>
+          </p:nvPr>
+        </p:nvSpPr>
+        <p:spPr>
+          <a:xfrm>
+            <a:off x="381300" y="685800"/>
+            <a:ext cx="6096000" cy="3429000"/>
+          </a:xfrm>
+          <a:custGeom>
+            <a:rect b="b" l="l" r="r" t="t"/>
+            <a:pathLst>
+              <a:path extrusionOk="0" h="120000" w="120000">
+                <a:moveTo>
+                  <a:pt x="0" y="0"/>
+                </a:moveTo>
+                <a:lnTo>
+                  <a:pt x="120000" y="0"/>
+                </a:lnTo>
+                <a:lnTo>
+                  <a:pt x="120000" y="120000"/>
+                </a:lnTo>
+                <a:lnTo>
+                  <a:pt x="0" y="120000"/>
+                </a:lnTo>
+                <a:close/>
+              </a:path>
+            </a:pathLst>
+          </a:custGeom>
+          <a:noFill/>
+          <a:ln cap="flat" cmpd="sng" w="9525">
+            <a:solidFill>
+              <a:srgbClr val="000000"/>
+            </a:solidFill>
+            <a:prstDash val="solid"/>
+            <a:round/>
+            <a:headEnd len="sm" w="sm" type="none"/>
+            <a:tailEnd len="sm" w="sm" type="none"/>
+          </a:ln>
+        </p:spPr>
+      </p:sp>
+      <p:sp>
+        <p:nvSpPr>
+          <p:cNvPr id="215" name="Google Shape;215;p14:notes"/>
+          <p:cNvSpPr txBox="1"/>
+          <p:nvPr>
+            <p:ph idx="1" type="body"/>
+          </p:nvPr>
+        </p:nvSpPr>
+        <p:spPr>
+          <a:xfrm>
+            <a:off x="685800" y="4343400"/>
+            <a:ext cx="5486400" cy="4114800"/>
+          </a:xfrm>
+          <a:prstGeom prst="rect">
+            <a:avLst/>
+          </a:prstGeom>
+          <a:noFill/>
+          <a:ln>
+            <a:noFill/>
+          </a:ln>
+        </p:spPr>
+        <p:txBody>
+          <a:bodyPr anchorCtr="0" anchor="t" bIns="91425" lIns="91425" spcFirstLastPara="1" rIns="91425" wrap="square" tIns="91425">
+            <a:noAutofit/>
+          </a:bodyPr>
+          <a:lstStyle/>
+          <a:p>
+            <a:pPr indent="0" lvl="0" marL="0" rtl="0" algn="l">
+              <a:lnSpc>
+                <a:spcPct val="100000"/>
+              </a:lnSpc>
+              <a:spcBef>
+                <a:spcPts val="0"/>
+              </a:spcBef>
+              <a:spcAft>
+                <a:spcPts val="0"/>
+              </a:spcAft>
+              <a:buSzPts val="1100"/>
+              <a:buNone/>
+            </a:pPr>
+            <a:r>
+              <a:t/>
+            </a:r>
+            <a:endParaRPr/>
+          </a:p>
+        </p:txBody>
+      </p:sp>
+    </p:spTree>
+  </p:cSld>
+  <p:clrMapOvr>
+    <a:masterClrMapping/>
+  </p:clrMapOvr>
+</p:notes>
+</file>
+
+<file path=ppt/notesSlides/notesSlide15.xml><?xml version="1.0" encoding="utf-8"?>
+<p:notes xmlns:a="http://schemas.openxmlformats.org/drawingml/2006/main" xmlns:r="http://schemas.openxmlformats.org/officeDocument/2006/relationships" xmlns:mc="http://schemas.openxmlformats.org/markup-compatibility/2006" xmlns:mv="urn:schemas-microsoft-com:mac:vml" xmlns:p="http://schemas.openxmlformats.org/presentationml/2006/main" xmlns:c="http://schemas.openxmlformats.org/drawingml/2006/chart" xmlns:dgm="http://schemas.openxmlformats.org/drawingml/2006/diagram" xmlns:o="urn:schemas-microsoft-com:office:office" xmlns:v="urn:schemas-microsoft-com:vml" xmlns:pvml="urn:schemas-microsoft-com:office:powerpoint" xmlns:com="http://schemas.openxmlformats.org/drawingml/2006/compatibility" xmlns:p14="http://schemas.microsoft.com/office/powerpoint/2010/main" xmlns:p15="http://schemas.microsoft.com/office/powerpoint/2012/main" xmlns:ahyp="http://schemas.microsoft.com/office/drawing/2018/hyperlinkcolor" showMasterPhAnim="0" showMasterSp="0">
+  <p:cSld>
+    <p:spTree>
+      <p:nvGrpSpPr>
+        <p:cNvPr id="219" name="Shape 219"/>
+        <p:cNvGrpSpPr/>
+        <p:nvPr/>
+      </p:nvGrpSpPr>
+      <p:grpSpPr>
+        <a:xfrm>
+          <a:off x="0" y="0"/>
+          <a:ext cx="0" cy="0"/>
+          <a:chOff x="0" y="0"/>
+          <a:chExt cx="0" cy="0"/>
+        </a:xfrm>
+      </p:grpSpPr>
+      <p:sp>
+        <p:nvSpPr>
+          <p:cNvPr id="220" name="Google Shape;220;g13c2ea6c5e8_0_0:notes"/>
+          <p:cNvSpPr/>
+          <p:nvPr>
+            <p:ph idx="2" type="sldImg"/>
+          </p:nvPr>
+        </p:nvSpPr>
+        <p:spPr>
+          <a:xfrm>
+            <a:off x="381300" y="685800"/>
+            <a:ext cx="6096000" cy="3429000"/>
+          </a:xfrm>
+          <a:custGeom>
+            <a:rect b="b" l="l" r="r" t="t"/>
+            <a:pathLst>
+              <a:path extrusionOk="0" h="120000" w="120000">
+                <a:moveTo>
+                  <a:pt x="0" y="0"/>
+                </a:moveTo>
+                <a:lnTo>
+                  <a:pt x="120000" y="0"/>
+                </a:lnTo>
+                <a:lnTo>
+                  <a:pt x="120000" y="120000"/>
+                </a:lnTo>
+                <a:lnTo>
+                  <a:pt x="0" y="120000"/>
+                </a:lnTo>
+                <a:close/>
+              </a:path>
+            </a:pathLst>
+          </a:custGeom>
+          <a:noFill/>
+          <a:ln cap="flat" cmpd="sng" w="9525">
+            <a:solidFill>
+              <a:srgbClr val="000000"/>
+            </a:solidFill>
+            <a:prstDash val="solid"/>
+            <a:round/>
+            <a:headEnd len="sm" w="sm" type="none"/>
+            <a:tailEnd len="sm" w="sm" type="none"/>
+          </a:ln>
+        </p:spPr>
+      </p:sp>
+      <p:sp>
+        <p:nvSpPr>
+          <p:cNvPr id="221" name="Google Shape;221;g13c2ea6c5e8_0_0:notes"/>
+          <p:cNvSpPr txBox="1"/>
+          <p:nvPr>
+            <p:ph idx="1" type="body"/>
+          </p:nvPr>
+        </p:nvSpPr>
+        <p:spPr>
+          <a:xfrm>
+            <a:off x="685800" y="4343400"/>
+            <a:ext cx="5486400" cy="4114800"/>
+          </a:xfrm>
+          <a:prstGeom prst="rect">
+            <a:avLst/>
+          </a:prstGeom>
+          <a:noFill/>
+          <a:ln>
+            <a:noFill/>
+          </a:ln>
+        </p:spPr>
+        <p:txBody>
+          <a:bodyPr anchorCtr="0" anchor="t" bIns="91425" lIns="91425" spcFirstLastPara="1" rIns="91425" wrap="square" tIns="91425">
+            <a:noAutofit/>
+          </a:bodyPr>
+          <a:lstStyle/>
+          <a:p>
+            <a:pPr indent="0" lvl="0" marL="0" rtl="0" algn="l">
+              <a:lnSpc>
+                <a:spcPct val="100000"/>
+              </a:lnSpc>
+              <a:spcBef>
+                <a:spcPts val="0"/>
+              </a:spcBef>
+              <a:spcAft>
+                <a:spcPts val="0"/>
+              </a:spcAft>
+              <a:buSzPts val="1100"/>
+              <a:buNone/>
+            </a:pPr>
+            <a:r>
+              <a:t/>
+            </a:r>
+            <a:endParaRPr/>
+          </a:p>
+        </p:txBody>
+      </p:sp>
+    </p:spTree>
+  </p:cSld>
+  <p:clrMapOvr>
+    <a:masterClrMapping/>
+  </p:clrMapOvr>
+</p:notes>
+</file>
+
+<file path=ppt/notesSlides/notesSlide16.xml><?xml version="1.0" encoding="utf-8"?>
+<p:notes xmlns:a="http://schemas.openxmlformats.org/drawingml/2006/main" xmlns:r="http://schemas.openxmlformats.org/officeDocument/2006/relationships" xmlns:mc="http://schemas.openxmlformats.org/markup-compatibility/2006" xmlns:mv="urn:schemas-microsoft-com:mac:vml" xmlns:p="http://schemas.openxmlformats.org/presentationml/2006/main" xmlns:c="http://schemas.openxmlformats.org/drawingml/2006/chart" xmlns:dgm="http://schemas.openxmlformats.org/drawingml/2006/diagram" xmlns:o="urn:schemas-microsoft-com:office:office" xmlns:v="urn:schemas-microsoft-com:vml" xmlns:pvml="urn:schemas-microsoft-com:office:powerpoint" xmlns:com="http://schemas.openxmlformats.org/drawingml/2006/compatibility" xmlns:p14="http://schemas.microsoft.com/office/powerpoint/2010/main" xmlns:p15="http://schemas.microsoft.com/office/powerpoint/2012/main" xmlns:ahyp="http://schemas.microsoft.com/office/drawing/2018/hyperlinkcolor" showMasterPhAnim="0" showMasterSp="0">
+  <p:cSld>
+    <p:spTree>
+      <p:nvGrpSpPr>
+        <p:cNvPr id="225" name="Shape 225"/>
+        <p:cNvGrpSpPr/>
+        <p:nvPr/>
+      </p:nvGrpSpPr>
+      <p:grpSpPr>
+        <a:xfrm>
+          <a:off x="0" y="0"/>
+          <a:ext cx="0" cy="0"/>
+          <a:chOff x="0" y="0"/>
+          <a:chExt cx="0" cy="0"/>
+        </a:xfrm>
+      </p:grpSpPr>
+      <p:sp>
+        <p:nvSpPr>
+          <p:cNvPr id="226" name="Google Shape;226;g13c2ea6c5e8_0_6:notes"/>
           <p:cNvSpPr/>
           <p:nvPr>
             <p:ph idx="2" type="sldImg"/>
@@ -1492,7 +1728,7 @@
       </p:sp>
       <p:sp>
         <p:nvSpPr>
-          <p:cNvPr id="213" name="Google Shape;213;g13c2ea6c5e8_0_6:notes"/>
+          <p:cNvPr id="227" name="Google Shape;227;g13c2ea6c5e8_0_6:notes"/>
           <p:cNvSpPr txBox="1"/>
           <p:nvPr>
             <p:ph idx="1" type="body"/>
@@ -14951,7 +15187,341 @@
       </p:grpSpPr>
       <p:sp>
         <p:nvSpPr>
-          <p:cNvPr id="197" name="Google Shape;197;p13"/>
+          <p:cNvPr id="197" name="Google Shape;197;g13ef684d110_0_0"/>
+          <p:cNvSpPr txBox="1"/>
+          <p:nvPr>
+            <p:ph type="title"/>
+          </p:nvPr>
+        </p:nvSpPr>
+        <p:spPr>
+          <a:xfrm>
+            <a:off x="1297500" y="393750"/>
+            <a:ext cx="7038900" cy="914100"/>
+          </a:xfrm>
+          <a:prstGeom prst="rect">
+            <a:avLst/>
+          </a:prstGeom>
+          <a:noFill/>
+          <a:ln>
+            <a:noFill/>
+          </a:ln>
+        </p:spPr>
+        <p:txBody>
+          <a:bodyPr anchorCtr="0" anchor="t" bIns="91425" lIns="91425" spcFirstLastPara="1" rIns="91425" wrap="square" tIns="91425">
+            <a:normAutofit/>
+          </a:bodyPr>
+          <a:lstStyle/>
+          <a:p>
+            <a:pPr indent="0" lvl="0" marL="0" rtl="0" algn="ctr">
+              <a:lnSpc>
+                <a:spcPct val="100000"/>
+              </a:lnSpc>
+              <a:spcBef>
+                <a:spcPts val="0"/>
+              </a:spcBef>
+              <a:spcAft>
+                <a:spcPts val="0"/>
+              </a:spcAft>
+              <a:buSzPts val="2400"/>
+              <a:buNone/>
+            </a:pPr>
+            <a:r>
+              <a:rPr lang="fr"/>
+              <a:t>Rôles et profils</a:t>
+            </a:r>
+            <a:endParaRPr/>
+          </a:p>
+        </p:txBody>
+      </p:sp>
+      <p:sp>
+        <p:nvSpPr>
+          <p:cNvPr id="198" name="Google Shape;198;g13ef684d110_0_0"/>
+          <p:cNvSpPr txBox="1"/>
+          <p:nvPr>
+            <p:ph idx="1" type="body"/>
+          </p:nvPr>
+        </p:nvSpPr>
+        <p:spPr>
+          <a:xfrm>
+            <a:off x="311700" y="1152475"/>
+            <a:ext cx="8520600" cy="837600"/>
+          </a:xfrm>
+          <a:prstGeom prst="rect">
+            <a:avLst/>
+          </a:prstGeom>
+          <a:noFill/>
+          <a:ln>
+            <a:noFill/>
+          </a:ln>
+        </p:spPr>
+        <p:txBody>
+          <a:bodyPr anchorCtr="0" anchor="t" bIns="91425" lIns="91425" spcFirstLastPara="1" rIns="91425" wrap="square" tIns="91425">
+            <a:normAutofit/>
+          </a:bodyPr>
+          <a:lstStyle/>
+          <a:p>
+            <a:pPr indent="0" lvl="0" marL="457200" rtl="0" algn="ctr">
+              <a:lnSpc>
+                <a:spcPct val="115000"/>
+              </a:lnSpc>
+              <a:spcBef>
+                <a:spcPts val="0"/>
+              </a:spcBef>
+              <a:spcAft>
+                <a:spcPts val="0"/>
+              </a:spcAft>
+              <a:buNone/>
+            </a:pPr>
+            <a:r>
+              <a:t/>
+            </a:r>
+            <a:endParaRPr/>
+          </a:p>
+          <a:p>
+            <a:pPr indent="-311150" lvl="0" marL="457200" rtl="0" algn="ctr">
+              <a:lnSpc>
+                <a:spcPct val="115000"/>
+              </a:lnSpc>
+              <a:spcBef>
+                <a:spcPts val="0"/>
+              </a:spcBef>
+              <a:spcAft>
+                <a:spcPts val="0"/>
+              </a:spcAft>
+              <a:buSzPts val="1300"/>
+              <a:buChar char="-"/>
+            </a:pPr>
+            <a:r>
+              <a:rPr lang="fr"/>
+              <a:t>Illustration d’une règle de partage</a:t>
+            </a:r>
+            <a:endParaRPr/>
+          </a:p>
+        </p:txBody>
+      </p:sp>
+      <p:pic>
+        <p:nvPicPr>
+          <p:cNvPr id="199" name="Google Shape;199;g13ef684d110_0_0"/>
+          <p:cNvPicPr preferRelativeResize="0"/>
+          <p:nvPr/>
+        </p:nvPicPr>
+        <p:blipFill>
+          <a:blip r:embed="rId3">
+            <a:alphaModFix/>
+          </a:blip>
+          <a:stretch>
+            <a:fillRect/>
+          </a:stretch>
+        </p:blipFill>
+        <p:spPr>
+          <a:xfrm>
+            <a:off x="2284838" y="1775600"/>
+            <a:ext cx="5064221" cy="2848624"/>
+          </a:xfrm>
+          <a:prstGeom prst="rect">
+            <a:avLst/>
+          </a:prstGeom>
+          <a:noFill/>
+          <a:ln>
+            <a:noFill/>
+          </a:ln>
+        </p:spPr>
+      </p:pic>
+    </p:spTree>
+  </p:cSld>
+  <p:clrMapOvr>
+    <a:masterClrMapping/>
+  </p:clrMapOvr>
+</p:sld>
+</file>
+
+<file path=ppt/slides/slide12.xml><?xml version="1.0" encoding="utf-8"?>
+<p:sld xmlns:a="http://schemas.openxmlformats.org/drawingml/2006/main" xmlns:r="http://schemas.openxmlformats.org/officeDocument/2006/relationships" xmlns:mc="http://schemas.openxmlformats.org/markup-compatibility/2006" xmlns:mv="urn:schemas-microsoft-com:mac:vml" xmlns:p="http://schemas.openxmlformats.org/presentationml/2006/main" xmlns:c="http://schemas.openxmlformats.org/drawingml/2006/chart" xmlns:dgm="http://schemas.openxmlformats.org/drawingml/2006/diagram" xmlns:o="urn:schemas-microsoft-com:office:office" xmlns:v="urn:schemas-microsoft-com:vml" xmlns:pvml="urn:schemas-microsoft-com:office:powerpoint" xmlns:com="http://schemas.openxmlformats.org/drawingml/2006/compatibility" xmlns:p14="http://schemas.microsoft.com/office/powerpoint/2010/main" xmlns:p15="http://schemas.microsoft.com/office/powerpoint/2012/main" xmlns:ahyp="http://schemas.microsoft.com/office/drawing/2018/hyperlinkcolor">
+  <p:cSld>
+    <p:spTree>
+      <p:nvGrpSpPr>
+        <p:cNvPr id="203" name="Shape 203"/>
+        <p:cNvGrpSpPr/>
+        <p:nvPr/>
+      </p:nvGrpSpPr>
+      <p:grpSpPr>
+        <a:xfrm>
+          <a:off x="0" y="0"/>
+          <a:ext cx="0" cy="0"/>
+          <a:chOff x="0" y="0"/>
+          <a:chExt cx="0" cy="0"/>
+        </a:xfrm>
+      </p:grpSpPr>
+      <p:sp>
+        <p:nvSpPr>
+          <p:cNvPr id="204" name="Google Shape;204;g13ef684d110_0_12"/>
+          <p:cNvSpPr txBox="1"/>
+          <p:nvPr>
+            <p:ph type="title"/>
+          </p:nvPr>
+        </p:nvSpPr>
+        <p:spPr>
+          <a:xfrm>
+            <a:off x="1297500" y="393750"/>
+            <a:ext cx="7038900" cy="914100"/>
+          </a:xfrm>
+          <a:prstGeom prst="rect">
+            <a:avLst/>
+          </a:prstGeom>
+          <a:noFill/>
+          <a:ln>
+            <a:noFill/>
+          </a:ln>
+        </p:spPr>
+        <p:txBody>
+          <a:bodyPr anchorCtr="0" anchor="t" bIns="91425" lIns="91425" spcFirstLastPara="1" rIns="91425" wrap="square" tIns="91425">
+            <a:normAutofit/>
+          </a:bodyPr>
+          <a:lstStyle/>
+          <a:p>
+            <a:pPr indent="0" lvl="0" marL="0" rtl="0" algn="ctr">
+              <a:lnSpc>
+                <a:spcPct val="100000"/>
+              </a:lnSpc>
+              <a:spcBef>
+                <a:spcPts val="0"/>
+              </a:spcBef>
+              <a:spcAft>
+                <a:spcPts val="0"/>
+              </a:spcAft>
+              <a:buSzPts val="2400"/>
+              <a:buNone/>
+            </a:pPr>
+            <a:r>
+              <a:rPr lang="fr"/>
+              <a:t>Rôles et profils</a:t>
+            </a:r>
+            <a:endParaRPr/>
+          </a:p>
+        </p:txBody>
+      </p:sp>
+      <p:sp>
+        <p:nvSpPr>
+          <p:cNvPr id="205" name="Google Shape;205;g13ef684d110_0_12"/>
+          <p:cNvSpPr txBox="1"/>
+          <p:nvPr>
+            <p:ph idx="1" type="body"/>
+          </p:nvPr>
+        </p:nvSpPr>
+        <p:spPr>
+          <a:xfrm>
+            <a:off x="311700" y="1152475"/>
+            <a:ext cx="8520600" cy="837600"/>
+          </a:xfrm>
+          <a:prstGeom prst="rect">
+            <a:avLst/>
+          </a:prstGeom>
+          <a:noFill/>
+          <a:ln>
+            <a:noFill/>
+          </a:ln>
+        </p:spPr>
+        <p:txBody>
+          <a:bodyPr anchorCtr="0" anchor="t" bIns="91425" lIns="91425" spcFirstLastPara="1" rIns="91425" wrap="square" tIns="91425">
+            <a:normAutofit/>
+          </a:bodyPr>
+          <a:lstStyle/>
+          <a:p>
+            <a:pPr indent="0" lvl="0" marL="457200" rtl="0" algn="ctr">
+              <a:lnSpc>
+                <a:spcPct val="115000"/>
+              </a:lnSpc>
+              <a:spcBef>
+                <a:spcPts val="0"/>
+              </a:spcBef>
+              <a:spcAft>
+                <a:spcPts val="0"/>
+              </a:spcAft>
+              <a:buNone/>
+            </a:pPr>
+            <a:r>
+              <a:t/>
+            </a:r>
+            <a:endParaRPr/>
+          </a:p>
+          <a:p>
+            <a:pPr indent="-311150" lvl="0" marL="457200" rtl="0" algn="ctr">
+              <a:lnSpc>
+                <a:spcPct val="115000"/>
+              </a:lnSpc>
+              <a:spcBef>
+                <a:spcPts val="0"/>
+              </a:spcBef>
+              <a:spcAft>
+                <a:spcPts val="0"/>
+              </a:spcAft>
+              <a:buSzPts val="1300"/>
+              <a:buChar char="-"/>
+            </a:pPr>
+            <a:r>
+              <a:rPr lang="fr"/>
+              <a:t>Illustration d’une règle de partage avec héritage</a:t>
+            </a:r>
+            <a:endParaRPr/>
+          </a:p>
+        </p:txBody>
+      </p:sp>
+      <p:pic>
+        <p:nvPicPr>
+          <p:cNvPr id="206" name="Google Shape;206;g13ef684d110_0_12"/>
+          <p:cNvPicPr preferRelativeResize="0"/>
+          <p:nvPr/>
+        </p:nvPicPr>
+        <p:blipFill>
+          <a:blip r:embed="rId3">
+            <a:alphaModFix/>
+          </a:blip>
+          <a:stretch>
+            <a:fillRect/>
+          </a:stretch>
+        </p:blipFill>
+        <p:spPr>
+          <a:xfrm>
+            <a:off x="2039888" y="1959050"/>
+            <a:ext cx="5064221" cy="2848624"/>
+          </a:xfrm>
+          <a:prstGeom prst="rect">
+            <a:avLst/>
+          </a:prstGeom>
+          <a:noFill/>
+          <a:ln>
+            <a:noFill/>
+          </a:ln>
+        </p:spPr>
+      </p:pic>
+    </p:spTree>
+  </p:cSld>
+  <p:clrMapOvr>
+    <a:masterClrMapping/>
+  </p:clrMapOvr>
+</p:sld>
+</file>
+
+<file path=ppt/slides/slide13.xml><?xml version="1.0" encoding="utf-8"?>
+<p:sld xmlns:a="http://schemas.openxmlformats.org/drawingml/2006/main" xmlns:r="http://schemas.openxmlformats.org/officeDocument/2006/relationships" xmlns:mc="http://schemas.openxmlformats.org/markup-compatibility/2006" xmlns:mv="urn:schemas-microsoft-com:mac:vml" xmlns:p="http://schemas.openxmlformats.org/presentationml/2006/main" xmlns:c="http://schemas.openxmlformats.org/drawingml/2006/chart" xmlns:dgm="http://schemas.openxmlformats.org/drawingml/2006/diagram" xmlns:o="urn:schemas-microsoft-com:office:office" xmlns:v="urn:schemas-microsoft-com:vml" xmlns:pvml="urn:schemas-microsoft-com:office:powerpoint" xmlns:com="http://schemas.openxmlformats.org/drawingml/2006/compatibility" xmlns:p14="http://schemas.microsoft.com/office/powerpoint/2010/main" xmlns:p15="http://schemas.microsoft.com/office/powerpoint/2012/main" xmlns:ahyp="http://schemas.microsoft.com/office/drawing/2018/hyperlinkcolor">
+  <p:cSld>
+    <p:spTree>
+      <p:nvGrpSpPr>
+        <p:cNvPr id="210" name="Shape 210"/>
+        <p:cNvGrpSpPr/>
+        <p:nvPr/>
+      </p:nvGrpSpPr>
+      <p:grpSpPr>
+        <a:xfrm>
+          <a:off x="0" y="0"/>
+          <a:ext cx="0" cy="0"/>
+          <a:chOff x="0" y="0"/>
+          <a:chExt cx="0" cy="0"/>
+        </a:xfrm>
+      </p:grpSpPr>
+      <p:sp>
+        <p:nvSpPr>
+          <p:cNvPr id="211" name="Google Shape;211;p13"/>
           <p:cNvSpPr txBox="1"/>
           <p:nvPr>
             <p:ph type="title"/>
@@ -14999,7 +15569,7 @@
       </p:sp>
       <p:pic>
         <p:nvPicPr>
-          <p:cNvPr id="198" name="Google Shape;198;p13"/>
+          <p:cNvPr id="212" name="Google Shape;212;p13"/>
           <p:cNvPicPr preferRelativeResize="0"/>
           <p:nvPr/>
         </p:nvPicPr>
@@ -15033,12 +15603,12 @@
 </p:sld>
 </file>
 
-<file path=ppt/slides/slide12.xml><?xml version="1.0" encoding="utf-8"?>
+<file path=ppt/slides/slide14.xml><?xml version="1.0" encoding="utf-8"?>
 <p:sld xmlns:a="http://schemas.openxmlformats.org/drawingml/2006/main" xmlns:r="http://schemas.openxmlformats.org/officeDocument/2006/relationships" xmlns:mc="http://schemas.openxmlformats.org/markup-compatibility/2006" xmlns:mv="urn:schemas-microsoft-com:mac:vml" xmlns:p="http://schemas.openxmlformats.org/presentationml/2006/main" xmlns:c="http://schemas.openxmlformats.org/drawingml/2006/chart" xmlns:dgm="http://schemas.openxmlformats.org/drawingml/2006/diagram" xmlns:o="urn:schemas-microsoft-com:office:office" xmlns:v="urn:schemas-microsoft-com:vml" xmlns:pvml="urn:schemas-microsoft-com:office:powerpoint" xmlns:com="http://schemas.openxmlformats.org/drawingml/2006/compatibility" xmlns:p14="http://schemas.microsoft.com/office/powerpoint/2010/main" xmlns:p15="http://schemas.microsoft.com/office/powerpoint/2012/main" xmlns:ahyp="http://schemas.microsoft.com/office/drawing/2018/hyperlinkcolor">
   <p:cSld>
     <p:spTree>
       <p:nvGrpSpPr>
-        <p:cNvPr id="202" name="Shape 202"/>
+        <p:cNvPr id="216" name="Shape 216"/>
         <p:cNvGrpSpPr/>
         <p:nvPr/>
       </p:nvGrpSpPr>
@@ -15052,7 +15622,7 @@
       </p:grpSpPr>
       <p:sp>
         <p:nvSpPr>
-          <p:cNvPr id="203" name="Google Shape;203;p14"/>
+          <p:cNvPr id="217" name="Google Shape;217;p14"/>
           <p:cNvSpPr txBox="1"/>
           <p:nvPr>
             <p:ph type="title"/>
@@ -15100,7 +15670,7 @@
       </p:sp>
       <p:pic>
         <p:nvPicPr>
-          <p:cNvPr id="204" name="Google Shape;204;p14"/>
+          <p:cNvPr id="218" name="Google Shape;218;p14"/>
           <p:cNvPicPr preferRelativeResize="0"/>
           <p:nvPr/>
         </p:nvPicPr>
@@ -15133,12 +15703,12 @@
 </p:sld>
 </file>
 
-<file path=ppt/slides/slide13.xml><?xml version="1.0" encoding="utf-8"?>
+<file path=ppt/slides/slide15.xml><?xml version="1.0" encoding="utf-8"?>
 <p:sld xmlns:a="http://schemas.openxmlformats.org/drawingml/2006/main" xmlns:r="http://schemas.openxmlformats.org/officeDocument/2006/relationships" xmlns:mc="http://schemas.openxmlformats.org/markup-compatibility/2006" xmlns:mv="urn:schemas-microsoft-com:mac:vml" xmlns:p="http://schemas.openxmlformats.org/presentationml/2006/main" xmlns:c="http://schemas.openxmlformats.org/drawingml/2006/chart" xmlns:dgm="http://schemas.openxmlformats.org/drawingml/2006/diagram" xmlns:o="urn:schemas-microsoft-com:office:office" xmlns:v="urn:schemas-microsoft-com:vml" xmlns:pvml="urn:schemas-microsoft-com:office:powerpoint" xmlns:com="http://schemas.openxmlformats.org/drawingml/2006/compatibility" xmlns:p14="http://schemas.microsoft.com/office/powerpoint/2010/main" xmlns:p15="http://schemas.microsoft.com/office/powerpoint/2012/main" xmlns:ahyp="http://schemas.microsoft.com/office/drawing/2018/hyperlinkcolor">
   <p:cSld>
     <p:spTree>
       <p:nvGrpSpPr>
-        <p:cNvPr id="208" name="Shape 208"/>
+        <p:cNvPr id="222" name="Shape 222"/>
         <p:cNvGrpSpPr/>
         <p:nvPr/>
       </p:nvGrpSpPr>
@@ -15152,7 +15722,7 @@
       </p:grpSpPr>
       <p:sp>
         <p:nvSpPr>
-          <p:cNvPr id="209" name="Google Shape;209;g13c2ea6c5e8_0_0"/>
+          <p:cNvPr id="223" name="Google Shape;223;g13c2ea6c5e8_0_0"/>
           <p:cNvSpPr txBox="1"/>
           <p:nvPr>
             <p:ph type="title"/>
@@ -15220,7 +15790,7 @@
       </p:sp>
       <p:pic>
         <p:nvPicPr>
-          <p:cNvPr id="210" name="Google Shape;210;g13c2ea6c5e8_0_0"/>
+          <p:cNvPr id="224" name="Google Shape;224;g13c2ea6c5e8_0_0"/>
           <p:cNvPicPr preferRelativeResize="0"/>
           <p:nvPr/>
         </p:nvPicPr>
@@ -15254,12 +15824,12 @@
 </p:sld>
 </file>
 
-<file path=ppt/slides/slide14.xml><?xml version="1.0" encoding="utf-8"?>
+<file path=ppt/slides/slide16.xml><?xml version="1.0" encoding="utf-8"?>
 <p:sld xmlns:a="http://schemas.openxmlformats.org/drawingml/2006/main" xmlns:r="http://schemas.openxmlformats.org/officeDocument/2006/relationships" xmlns:mc="http://schemas.openxmlformats.org/markup-compatibility/2006" xmlns:mv="urn:schemas-microsoft-com:mac:vml" xmlns:p="http://schemas.openxmlformats.org/presentationml/2006/main" xmlns:c="http://schemas.openxmlformats.org/drawingml/2006/chart" xmlns:dgm="http://schemas.openxmlformats.org/drawingml/2006/diagram" xmlns:o="urn:schemas-microsoft-com:office:office" xmlns:v="urn:schemas-microsoft-com:vml" xmlns:pvml="urn:schemas-microsoft-com:office:powerpoint" xmlns:com="http://schemas.openxmlformats.org/drawingml/2006/compatibility" xmlns:p14="http://schemas.microsoft.com/office/powerpoint/2010/main" xmlns:p15="http://schemas.microsoft.com/office/powerpoint/2012/main" xmlns:ahyp="http://schemas.microsoft.com/office/drawing/2018/hyperlinkcolor">
   <p:cSld>
     <p:spTree>
       <p:nvGrpSpPr>
-        <p:cNvPr id="214" name="Shape 214"/>
+        <p:cNvPr id="228" name="Shape 228"/>
         <p:cNvGrpSpPr/>
         <p:nvPr/>
       </p:nvGrpSpPr>
@@ -15273,7 +15843,7 @@
       </p:grpSpPr>
       <p:sp>
         <p:nvSpPr>
-          <p:cNvPr id="215" name="Google Shape;215;g13c2ea6c5e8_0_6"/>
+          <p:cNvPr id="229" name="Google Shape;229;g13c2ea6c5e8_0_6"/>
           <p:cNvSpPr txBox="1"/>
           <p:nvPr>
             <p:ph type="title"/>
@@ -15313,7 +15883,7 @@
       </p:sp>
       <p:sp>
         <p:nvSpPr>
-          <p:cNvPr id="216" name="Google Shape;216;g13c2ea6c5e8_0_6"/>
+          <p:cNvPr id="230" name="Google Shape;230;g13c2ea6c5e8_0_6"/>
           <p:cNvSpPr txBox="1"/>
           <p:nvPr>
             <p:ph idx="1" type="body"/>
@@ -16560,6 +17130,285 @@
 </file>
 
 <file path=ppt/theme/theme1.xml><?xml version="1.0" encoding="utf-8"?>
+<a:theme xmlns:a="http://schemas.openxmlformats.org/drawingml/2006/main" xmlns:r="http://schemas.openxmlformats.org/officeDocument/2006/relationships">
+  <a:themeElements>
+    <a:clrScheme name="Default">
+      <a:dk1>
+        <a:srgbClr val="000000"/>
+      </a:dk1>
+      <a:lt1>
+        <a:srgbClr val="FFFFFF"/>
+      </a:lt1>
+      <a:dk2>
+        <a:srgbClr val="158158"/>
+      </a:dk2>
+      <a:lt2>
+        <a:srgbClr val="F3F3F3"/>
+      </a:lt2>
+      <a:accent1>
+        <a:srgbClr val="058DC7"/>
+      </a:accent1>
+      <a:accent2>
+        <a:srgbClr val="50B432"/>
+      </a:accent2>
+      <a:accent3>
+        <a:srgbClr val="ED561B"/>
+      </a:accent3>
+      <a:accent4>
+        <a:srgbClr val="EDEF00"/>
+      </a:accent4>
+      <a:accent5>
+        <a:srgbClr val="24CBE5"/>
+      </a:accent5>
+      <a:accent6>
+        <a:srgbClr val="64E572"/>
+      </a:accent6>
+      <a:hlink>
+        <a:srgbClr val="2200CC"/>
+      </a:hlink>
+      <a:folHlink>
+        <a:srgbClr val="551A8B"/>
+      </a:folHlink>
+    </a:clrScheme>
+    <a:fontScheme name="Office">
+      <a:majorFont>
+        <a:latin typeface="Arial"/>
+        <a:ea typeface=""/>
+        <a:cs typeface=""/>
+        <a:font script="Jpan" typeface="ＭＳ Ｐゴシック"/>
+        <a:font script="Hang" typeface="맑은 고딕"/>
+        <a:font script="Hans" typeface="宋体"/>
+        <a:font script="Hant" typeface="新細明體"/>
+        <a:font script="Arab" typeface="Times New Roman"/>
+        <a:font script="Hebr" typeface="Times New Roman"/>
+        <a:font script="Thai" typeface="Angsana New"/>
+        <a:font script="Ethi" typeface="Nyala"/>
+        <a:font script="Beng" typeface="Vrinda"/>
+        <a:font script="Gujr" typeface="Shruti"/>
+        <a:font script="Khmr" typeface="MoolBoran"/>
+        <a:font script="Knda" typeface="Tunga"/>
+        <a:font script="Guru" typeface="Raavi"/>
+        <a:font script="Cans" typeface="Euphemia"/>
+        <a:font script="Cher" typeface="Plantagenet Cherokee"/>
+        <a:font script="Yiii" typeface="Microsoft Yi Baiti"/>
+        <a:font script="Tibt" typeface="Microsoft Himalaya"/>
+        <a:font script="Thaa" typeface="MV Boli"/>
+        <a:font script="Deva" typeface="Mangal"/>
+        <a:font script="Telu" typeface="Gautami"/>
+        <a:font script="Taml" typeface="Latha"/>
+        <a:font script="Syrc" typeface="Estrangelo Edessa"/>
+        <a:font script="Orya" typeface="Kalinga"/>
+        <a:font script="Mlym" typeface="Kartika"/>
+        <a:font script="Laoo" typeface="DokChampa"/>
+        <a:font script="Sinh" typeface="Iskoola Pota"/>
+        <a:font script="Mong" typeface="Mongolian Baiti"/>
+        <a:font script="Viet" typeface="Times New Roman"/>
+        <a:font script="Uigh" typeface="Microsoft Uighur"/>
+        <a:font script="Geor" typeface="Sylfaen"/>
+      </a:majorFont>
+      <a:minorFont>
+        <a:latin typeface="Arial"/>
+        <a:ea typeface=""/>
+        <a:cs typeface=""/>
+        <a:font script="Jpan" typeface="ＭＳ Ｐゴシック"/>
+        <a:font script="Hang" typeface="맑은 고딕"/>
+        <a:font script="Hans" typeface="宋体"/>
+        <a:font script="Hant" typeface="新細明體"/>
+        <a:font script="Arab" typeface="Arial"/>
+        <a:font script="Hebr" typeface="Arial"/>
+        <a:font script="Thai" typeface="Cordia New"/>
+        <a:font script="Ethi" typeface="Nyala"/>
+        <a:font script="Beng" typeface="Vrinda"/>
+        <a:font script="Gujr" typeface="Shruti"/>
+        <a:font script="Khmr" typeface="DaunPenh"/>
+        <a:font script="Knda" typeface="Tunga"/>
+        <a:font script="Guru" typeface="Raavi"/>
+        <a:font script="Cans" typeface="Euphemia"/>
+        <a:font script="Cher" typeface="Plantagenet Cherokee"/>
+        <a:font script="Yiii" typeface="Microsoft Yi Baiti"/>
+        <a:font script="Tibt" typeface="Microsoft Himalaya"/>
+        <a:font script="Thaa" typeface="MV Boli"/>
+        <a:font script="Deva" typeface="Mangal"/>
+        <a:font script="Telu" typeface="Gautami"/>
+        <a:font script="Taml" typeface="Latha"/>
+        <a:font script="Syrc" typeface="Estrangelo Edessa"/>
+        <a:font script="Orya" typeface="Kalinga"/>
+        <a:font script="Mlym" typeface="Kartika"/>
+        <a:font script="Laoo" typeface="DokChampa"/>
+        <a:font script="Sinh" typeface="Iskoola Pota"/>
+        <a:font script="Mong" typeface="Mongolian Baiti"/>
+        <a:font script="Viet" typeface="Arial"/>
+        <a:font script="Uigh" typeface="Microsoft Uighur"/>
+        <a:font script="Geor" typeface="Sylfaen"/>
+      </a:minorFont>
+    </a:fontScheme>
+    <a:fmtScheme name="Office">
+      <a:fillStyleLst>
+        <a:solidFill>
+          <a:schemeClr val="phClr"/>
+        </a:solidFill>
+        <a:gradFill rotWithShape="1">
+          <a:gsLst>
+            <a:gs pos="0">
+              <a:schemeClr val="phClr">
+                <a:tint val="50000"/>
+                <a:satMod val="300000"/>
+              </a:schemeClr>
+            </a:gs>
+            <a:gs pos="35000">
+              <a:schemeClr val="phClr">
+                <a:tint val="37000"/>
+                <a:satMod val="300000"/>
+              </a:schemeClr>
+            </a:gs>
+            <a:gs pos="100000">
+              <a:schemeClr val="phClr">
+                <a:tint val="15000"/>
+                <a:satMod val="350000"/>
+              </a:schemeClr>
+            </a:gs>
+          </a:gsLst>
+          <a:lin ang="16200000" scaled="1"/>
+        </a:gradFill>
+        <a:gradFill rotWithShape="1">
+          <a:gsLst>
+            <a:gs pos="0">
+              <a:schemeClr val="phClr">
+                <a:tint val="100000"/>
+                <a:shade val="100000"/>
+                <a:satMod val="130000"/>
+              </a:schemeClr>
+            </a:gs>
+            <a:gs pos="100000">
+              <a:schemeClr val="phClr">
+                <a:tint val="50000"/>
+                <a:shade val="100000"/>
+                <a:satMod val="350000"/>
+              </a:schemeClr>
+            </a:gs>
+          </a:gsLst>
+          <a:lin ang="16200000" scaled="0"/>
+        </a:gradFill>
+      </a:fillStyleLst>
+      <a:lnStyleLst>
+        <a:ln w="9525" cap="flat" cmpd="sng" algn="ctr">
+          <a:solidFill>
+            <a:schemeClr val="phClr">
+              <a:shade val="95000"/>
+              <a:satMod val="105000"/>
+            </a:schemeClr>
+          </a:solidFill>
+          <a:prstDash val="solid"/>
+        </a:ln>
+        <a:ln w="25400" cap="flat" cmpd="sng" algn="ctr">
+          <a:solidFill>
+            <a:schemeClr val="phClr"/>
+          </a:solidFill>
+          <a:prstDash val="solid"/>
+        </a:ln>
+        <a:ln w="38100" cap="flat" cmpd="sng" algn="ctr">
+          <a:solidFill>
+            <a:schemeClr val="phClr"/>
+          </a:solidFill>
+          <a:prstDash val="solid"/>
+        </a:ln>
+      </a:lnStyleLst>
+      <a:effectStyleLst>
+        <a:effectStyle>
+          <a:effectLst>
+            <a:outerShdw blurRad="40000" dist="20000" dir="5400000" rotWithShape="0">
+              <a:srgbClr val="000000">
+                <a:alpha val="38000"/>
+              </a:srgbClr>
+            </a:outerShdw>
+          </a:effectLst>
+        </a:effectStyle>
+        <a:effectStyle>
+          <a:effectLst>
+            <a:outerShdw blurRad="40000" dist="23000" dir="5400000" rotWithShape="0">
+              <a:srgbClr val="000000">
+                <a:alpha val="35000"/>
+              </a:srgbClr>
+            </a:outerShdw>
+          </a:effectLst>
+        </a:effectStyle>
+        <a:effectStyle>
+          <a:effectLst>
+            <a:outerShdw blurRad="40000" dist="23000" dir="5400000" rotWithShape="0">
+              <a:srgbClr val="000000">
+                <a:alpha val="35000"/>
+              </a:srgbClr>
+            </a:outerShdw>
+          </a:effectLst>
+          <a:scene3d>
+            <a:camera prst="orthographicFront">
+              <a:rot lat="0" lon="0" rev="0"/>
+            </a:camera>
+            <a:lightRig rig="threePt" dir="t">
+              <a:rot lat="0" lon="0" rev="1200000"/>
+            </a:lightRig>
+          </a:scene3d>
+          <a:sp3d>
+            <a:bevelT w="63500" h="25400"/>
+          </a:sp3d>
+        </a:effectStyle>
+      </a:effectStyleLst>
+      <a:bgFillStyleLst>
+        <a:solidFill>
+          <a:schemeClr val="phClr"/>
+        </a:solidFill>
+        <a:gradFill rotWithShape="1">
+          <a:gsLst>
+            <a:gs pos="0">
+              <a:schemeClr val="phClr">
+                <a:tint val="40000"/>
+                <a:satMod val="350000"/>
+              </a:schemeClr>
+            </a:gs>
+            <a:gs pos="40000">
+              <a:schemeClr val="phClr">
+                <a:tint val="45000"/>
+                <a:shade val="99000"/>
+                <a:satMod val="350000"/>
+              </a:schemeClr>
+            </a:gs>
+            <a:gs pos="100000">
+              <a:schemeClr val="phClr">
+                <a:shade val="20000"/>
+                <a:satMod val="255000"/>
+              </a:schemeClr>
+            </a:gs>
+          </a:gsLst>
+          <a:path path="circle">
+            <a:fillToRect l="50000" t="-80000" r="50000" b="180000"/>
+          </a:path>
+        </a:gradFill>
+        <a:gradFill rotWithShape="1">
+          <a:gsLst>
+            <a:gs pos="0">
+              <a:schemeClr val="phClr">
+                <a:tint val="80000"/>
+                <a:satMod val="300000"/>
+              </a:schemeClr>
+            </a:gs>
+            <a:gs pos="100000">
+              <a:schemeClr val="phClr">
+                <a:shade val="30000"/>
+                <a:satMod val="200000"/>
+              </a:schemeClr>
+            </a:gs>
+          </a:gsLst>
+          <a:path path="circle">
+            <a:fillToRect l="50000" t="50000" r="50000" b="50000"/>
+          </a:path>
+        </a:gradFill>
+      </a:bgFillStyleLst>
+    </a:fmtScheme>
+  </a:themeElements>
+</a:theme>
+</file>
+
+<file path=ppt/theme/theme2.xml><?xml version="1.0" encoding="utf-8"?>
 <a:theme xmlns:a="http://schemas.openxmlformats.org/drawingml/2006/main" xmlns:r="http://schemas.openxmlformats.org/officeDocument/2006/relationships" name="Focus">
   <a:themeElements>
     <a:clrScheme name="Focus">
@@ -16836,283 +17685,4 @@
     </a:fmtScheme>
   </a:themeElements>
 </a:theme>
-</file>
-
-<file path=ppt/theme/theme2.xml><?xml version="1.0" encoding="utf-8"?>
-<a:theme xmlns:a="http://schemas.openxmlformats.org/drawingml/2006/main" xmlns:r="http://schemas.openxmlformats.org/officeDocument/2006/relationships">
-  <a:themeElements>
-    <a:clrScheme name="Default">
-      <a:dk1>
-        <a:srgbClr val="000000"/>
-      </a:dk1>
-      <a:lt1>
-        <a:srgbClr val="FFFFFF"/>
-      </a:lt1>
-      <a:dk2>
-        <a:srgbClr val="158158"/>
-      </a:dk2>
-      <a:lt2>
-        <a:srgbClr val="F3F3F3"/>
-      </a:lt2>
-      <a:accent1>
-        <a:srgbClr val="058DC7"/>
-      </a:accent1>
-      <a:accent2>
-        <a:srgbClr val="50B432"/>
-      </a:accent2>
-      <a:accent3>
-        <a:srgbClr val="ED561B"/>
-      </a:accent3>
-      <a:accent4>
-        <a:srgbClr val="EDEF00"/>
-      </a:accent4>
-      <a:accent5>
-        <a:srgbClr val="24CBE5"/>
-      </a:accent5>
-      <a:accent6>
-        <a:srgbClr val="64E572"/>
-      </a:accent6>
-      <a:hlink>
-        <a:srgbClr val="2200CC"/>
-      </a:hlink>
-      <a:folHlink>
-        <a:srgbClr val="551A8B"/>
-      </a:folHlink>
-    </a:clrScheme>
-    <a:fontScheme name="Office">
-      <a:majorFont>
-        <a:latin typeface="Arial"/>
-        <a:ea typeface=""/>
-        <a:cs typeface=""/>
-        <a:font script="Jpan" typeface="ＭＳ Ｐゴシック"/>
-        <a:font script="Hang" typeface="맑은 고딕"/>
-        <a:font script="Hans" typeface="宋体"/>
-        <a:font script="Hant" typeface="新細明體"/>
-        <a:font script="Arab" typeface="Times New Roman"/>
-        <a:font script="Hebr" typeface="Times New Roman"/>
-        <a:font script="Thai" typeface="Angsana New"/>
-        <a:font script="Ethi" typeface="Nyala"/>
-        <a:font script="Beng" typeface="Vrinda"/>
-        <a:font script="Gujr" typeface="Shruti"/>
-        <a:font script="Khmr" typeface="MoolBoran"/>
-        <a:font script="Knda" typeface="Tunga"/>
-        <a:font script="Guru" typeface="Raavi"/>
-        <a:font script="Cans" typeface="Euphemia"/>
-        <a:font script="Cher" typeface="Plantagenet Cherokee"/>
-        <a:font script="Yiii" typeface="Microsoft Yi Baiti"/>
-        <a:font script="Tibt" typeface="Microsoft Himalaya"/>
-        <a:font script="Thaa" typeface="MV Boli"/>
-        <a:font script="Deva" typeface="Mangal"/>
-        <a:font script="Telu" typeface="Gautami"/>
-        <a:font script="Taml" typeface="Latha"/>
-        <a:font script="Syrc" typeface="Estrangelo Edessa"/>
-        <a:font script="Orya" typeface="Kalinga"/>
-        <a:font script="Mlym" typeface="Kartika"/>
-        <a:font script="Laoo" typeface="DokChampa"/>
-        <a:font script="Sinh" typeface="Iskoola Pota"/>
-        <a:font script="Mong" typeface="Mongolian Baiti"/>
-        <a:font script="Viet" typeface="Times New Roman"/>
-        <a:font script="Uigh" typeface="Microsoft Uighur"/>
-        <a:font script="Geor" typeface="Sylfaen"/>
-      </a:majorFont>
-      <a:minorFont>
-        <a:latin typeface="Arial"/>
-        <a:ea typeface=""/>
-        <a:cs typeface=""/>
-        <a:font script="Jpan" typeface="ＭＳ Ｐゴシック"/>
-        <a:font script="Hang" typeface="맑은 고딕"/>
-        <a:font script="Hans" typeface="宋体"/>
-        <a:font script="Hant" typeface="新細明體"/>
-        <a:font script="Arab" typeface="Arial"/>
-        <a:font script="Hebr" typeface="Arial"/>
-        <a:font script="Thai" typeface="Cordia New"/>
-        <a:font script="Ethi" typeface="Nyala"/>
-        <a:font script="Beng" typeface="Vrinda"/>
-        <a:font script="Gujr" typeface="Shruti"/>
-        <a:font script="Khmr" typeface="DaunPenh"/>
-        <a:font script="Knda" typeface="Tunga"/>
-        <a:font script="Guru" typeface="Raavi"/>
-        <a:font script="Cans" typeface="Euphemia"/>
-        <a:font script="Cher" typeface="Plantagenet Cherokee"/>
-        <a:font script="Yiii" typeface="Microsoft Yi Baiti"/>
-        <a:font script="Tibt" typeface="Microsoft Himalaya"/>
-        <a:font script="Thaa" typeface="MV Boli"/>
-        <a:font script="Deva" typeface="Mangal"/>
-        <a:font script="Telu" typeface="Gautami"/>
-        <a:font script="Taml" typeface="Latha"/>
-        <a:font script="Syrc" typeface="Estrangelo Edessa"/>
-        <a:font script="Orya" typeface="Kalinga"/>
-        <a:font script="Mlym" typeface="Kartika"/>
-        <a:font script="Laoo" typeface="DokChampa"/>
-        <a:font script="Sinh" typeface="Iskoola Pota"/>
-        <a:font script="Mong" typeface="Mongolian Baiti"/>
-        <a:font script="Viet" typeface="Arial"/>
-        <a:font script="Uigh" typeface="Microsoft Uighur"/>
-        <a:font script="Geor" typeface="Sylfaen"/>
-      </a:minorFont>
-    </a:fontScheme>
-    <a:fmtScheme name="Office">
-      <a:fillStyleLst>
-        <a:solidFill>
-          <a:schemeClr val="phClr"/>
-        </a:solidFill>
-        <a:gradFill rotWithShape="1">
-          <a:gsLst>
-            <a:gs pos="0">
-              <a:schemeClr val="phClr">
-                <a:tint val="50000"/>
-                <a:satMod val="300000"/>
-              </a:schemeClr>
-            </a:gs>
-            <a:gs pos="35000">
-              <a:schemeClr val="phClr">
-                <a:tint val="37000"/>
-                <a:satMod val="300000"/>
-              </a:schemeClr>
-            </a:gs>
-            <a:gs pos="100000">
-              <a:schemeClr val="phClr">
-                <a:tint val="15000"/>
-                <a:satMod val="350000"/>
-              </a:schemeClr>
-            </a:gs>
-          </a:gsLst>
-          <a:lin ang="16200000" scaled="1"/>
-        </a:gradFill>
-        <a:gradFill rotWithShape="1">
-          <a:gsLst>
-            <a:gs pos="0">
-              <a:schemeClr val="phClr">
-                <a:tint val="100000"/>
-                <a:shade val="100000"/>
-                <a:satMod val="130000"/>
-              </a:schemeClr>
-            </a:gs>
-            <a:gs pos="100000">
-              <a:schemeClr val="phClr">
-                <a:tint val="50000"/>
-                <a:shade val="100000"/>
-                <a:satMod val="350000"/>
-              </a:schemeClr>
-            </a:gs>
-          </a:gsLst>
-          <a:lin ang="16200000" scaled="0"/>
-        </a:gradFill>
-      </a:fillStyleLst>
-      <a:lnStyleLst>
-        <a:ln w="9525" cap="flat" cmpd="sng" algn="ctr">
-          <a:solidFill>
-            <a:schemeClr val="phClr">
-              <a:shade val="95000"/>
-              <a:satMod val="105000"/>
-            </a:schemeClr>
-          </a:solidFill>
-          <a:prstDash val="solid"/>
-        </a:ln>
-        <a:ln w="25400" cap="flat" cmpd="sng" algn="ctr">
-          <a:solidFill>
-            <a:schemeClr val="phClr"/>
-          </a:solidFill>
-          <a:prstDash val="solid"/>
-        </a:ln>
-        <a:ln w="38100" cap="flat" cmpd="sng" algn="ctr">
-          <a:solidFill>
-            <a:schemeClr val="phClr"/>
-          </a:solidFill>
-          <a:prstDash val="solid"/>
-        </a:ln>
-      </a:lnStyleLst>
-      <a:effectStyleLst>
-        <a:effectStyle>
-          <a:effectLst>
-            <a:outerShdw blurRad="40000" dist="20000" dir="5400000" rotWithShape="0">
-              <a:srgbClr val="000000">
-                <a:alpha val="38000"/>
-              </a:srgbClr>
-            </a:outerShdw>
-          </a:effectLst>
-        </a:effectStyle>
-        <a:effectStyle>
-          <a:effectLst>
-            <a:outerShdw blurRad="40000" dist="23000" dir="5400000" rotWithShape="0">
-              <a:srgbClr val="000000">
-                <a:alpha val="35000"/>
-              </a:srgbClr>
-            </a:outerShdw>
-          </a:effectLst>
-        </a:effectStyle>
-        <a:effectStyle>
-          <a:effectLst>
-            <a:outerShdw blurRad="40000" dist="23000" dir="5400000" rotWithShape="0">
-              <a:srgbClr val="000000">
-                <a:alpha val="35000"/>
-              </a:srgbClr>
-            </a:outerShdw>
-          </a:effectLst>
-          <a:scene3d>
-            <a:camera prst="orthographicFront">
-              <a:rot lat="0" lon="0" rev="0"/>
-            </a:camera>
-            <a:lightRig rig="threePt" dir="t">
-              <a:rot lat="0" lon="0" rev="1200000"/>
-            </a:lightRig>
-          </a:scene3d>
-          <a:sp3d>
-            <a:bevelT w="63500" h="25400"/>
-          </a:sp3d>
-        </a:effectStyle>
-      </a:effectStyleLst>
-      <a:bgFillStyleLst>
-        <a:solidFill>
-          <a:schemeClr val="phClr"/>
-        </a:solidFill>
-        <a:gradFill rotWithShape="1">
-          <a:gsLst>
-            <a:gs pos="0">
-              <a:schemeClr val="phClr">
-                <a:tint val="40000"/>
-                <a:satMod val="350000"/>
-              </a:schemeClr>
-            </a:gs>
-            <a:gs pos="40000">
-              <a:schemeClr val="phClr">
-                <a:tint val="45000"/>
-                <a:shade val="99000"/>
-                <a:satMod val="350000"/>
-              </a:schemeClr>
-            </a:gs>
-            <a:gs pos="100000">
-              <a:schemeClr val="phClr">
-                <a:shade val="20000"/>
-                <a:satMod val="255000"/>
-              </a:schemeClr>
-            </a:gs>
-          </a:gsLst>
-          <a:path path="circle">
-            <a:fillToRect l="50000" t="-80000" r="50000" b="180000"/>
-          </a:path>
-        </a:gradFill>
-        <a:gradFill rotWithShape="1">
-          <a:gsLst>
-            <a:gs pos="0">
-              <a:schemeClr val="phClr">
-                <a:tint val="80000"/>
-                <a:satMod val="300000"/>
-              </a:schemeClr>
-            </a:gs>
-            <a:gs pos="100000">
-              <a:schemeClr val="phClr">
-                <a:shade val="30000"/>
-                <a:satMod val="200000"/>
-              </a:schemeClr>
-            </a:gs>
-          </a:gsLst>
-          <a:path path="circle">
-            <a:fillToRect l="50000" t="50000" r="50000" b="50000"/>
-          </a:path>
-        </a:gradFill>
-      </a:bgFillStyleLst>
-    </a:fmtScheme>
-  </a:themeElements>
-</a:theme>
 </file>
</xml_diff>